<commit_message>
Add and update class files.
</commit_message>
<xml_diff>
--- a/CPSC-24500/Week01/2016SpringW01Slides.pptx
+++ b/CPSC-24500/Week01/2016SpringW01Slides.pptx
@@ -228,7 +228,7 @@
           <a:p>
             <a:fld id="{91ED72D7-FE6F-4B82-8D31-76BC00B06094}" type="datetimeFigureOut">
               <a:rPr lang="en-US" smtClean="0"/>
-              <a:t>3/14/2017</a:t>
+              <a:t>3/15/2017</a:t>
             </a:fld>
             <a:endParaRPr lang="en-US"/>
           </a:p>
@@ -1807,11 +1807,7 @@
           <a:p>
             <a:r>
               <a:rPr lang="en-US" dirty="0"/>
-              <a:t>O</a:t>
-            </a:r>
-            <a:r>
-              <a:rPr lang="en-US" dirty="0"/>
-              <a:t>bject oriented programming practices evolve and reprioritize depending on the development </a:t>
+              <a:t>Object oriented programming practices evolve and reprioritize depending on the development </a:t>
             </a:r>
           </a:p>
           <a:p>
@@ -2555,7 +2551,7 @@
           <a:p>
             <a:fld id="{969F32F5-AB1C-41B2-AE79-C9DE1D1745A4}" type="datetimeFigureOut">
               <a:rPr lang="en-US" smtClean="0"/>
-              <a:t>3/14/2017</a:t>
+              <a:t>3/15/2017</a:t>
             </a:fld>
             <a:endParaRPr lang="en-US"/>
           </a:p>
@@ -2723,7 +2719,7 @@
           <a:p>
             <a:fld id="{969F32F5-AB1C-41B2-AE79-C9DE1D1745A4}" type="datetimeFigureOut">
               <a:rPr lang="en-US" smtClean="0"/>
-              <a:t>3/14/2017</a:t>
+              <a:t>3/15/2017</a:t>
             </a:fld>
             <a:endParaRPr lang="en-US"/>
           </a:p>
@@ -2901,7 +2897,7 @@
           <a:p>
             <a:fld id="{969F32F5-AB1C-41B2-AE79-C9DE1D1745A4}" type="datetimeFigureOut">
               <a:rPr lang="en-US" smtClean="0"/>
-              <a:t>3/14/2017</a:t>
+              <a:t>3/15/2017</a:t>
             </a:fld>
             <a:endParaRPr lang="en-US"/>
           </a:p>
@@ -3069,7 +3065,7 @@
           <a:p>
             <a:fld id="{969F32F5-AB1C-41B2-AE79-C9DE1D1745A4}" type="datetimeFigureOut">
               <a:rPr lang="en-US" smtClean="0"/>
-              <a:t>3/14/2017</a:t>
+              <a:t>3/15/2017</a:t>
             </a:fld>
             <a:endParaRPr lang="en-US"/>
           </a:p>
@@ -3314,7 +3310,7 @@
           <a:p>
             <a:fld id="{969F32F5-AB1C-41B2-AE79-C9DE1D1745A4}" type="datetimeFigureOut">
               <a:rPr lang="en-US" smtClean="0"/>
-              <a:t>3/14/2017</a:t>
+              <a:t>3/15/2017</a:t>
             </a:fld>
             <a:endParaRPr lang="en-US"/>
           </a:p>
@@ -3543,7 +3539,7 @@
           <a:p>
             <a:fld id="{969F32F5-AB1C-41B2-AE79-C9DE1D1745A4}" type="datetimeFigureOut">
               <a:rPr lang="en-US" smtClean="0"/>
-              <a:t>3/14/2017</a:t>
+              <a:t>3/15/2017</a:t>
             </a:fld>
             <a:endParaRPr lang="en-US"/>
           </a:p>
@@ -3907,7 +3903,7 @@
           <a:p>
             <a:fld id="{969F32F5-AB1C-41B2-AE79-C9DE1D1745A4}" type="datetimeFigureOut">
               <a:rPr lang="en-US" smtClean="0"/>
-              <a:t>3/14/2017</a:t>
+              <a:t>3/15/2017</a:t>
             </a:fld>
             <a:endParaRPr lang="en-US"/>
           </a:p>
@@ -4024,7 +4020,7 @@
           <a:p>
             <a:fld id="{969F32F5-AB1C-41B2-AE79-C9DE1D1745A4}" type="datetimeFigureOut">
               <a:rPr lang="en-US" smtClean="0"/>
-              <a:t>3/14/2017</a:t>
+              <a:t>3/15/2017</a:t>
             </a:fld>
             <a:endParaRPr lang="en-US"/>
           </a:p>
@@ -4119,7 +4115,7 @@
           <a:p>
             <a:fld id="{969F32F5-AB1C-41B2-AE79-C9DE1D1745A4}" type="datetimeFigureOut">
               <a:rPr lang="en-US" smtClean="0"/>
-              <a:t>3/14/2017</a:t>
+              <a:t>3/15/2017</a:t>
             </a:fld>
             <a:endParaRPr lang="en-US"/>
           </a:p>
@@ -4394,7 +4390,7 @@
           <a:p>
             <a:fld id="{969F32F5-AB1C-41B2-AE79-C9DE1D1745A4}" type="datetimeFigureOut">
               <a:rPr lang="en-US" smtClean="0"/>
-              <a:t>3/14/2017</a:t>
+              <a:t>3/15/2017</a:t>
             </a:fld>
             <a:endParaRPr lang="en-US"/>
           </a:p>
@@ -4646,7 +4642,7 @@
           <a:p>
             <a:fld id="{969F32F5-AB1C-41B2-AE79-C9DE1D1745A4}" type="datetimeFigureOut">
               <a:rPr lang="en-US" smtClean="0"/>
-              <a:t>3/14/2017</a:t>
+              <a:t>3/15/2017</a:t>
             </a:fld>
             <a:endParaRPr lang="en-US"/>
           </a:p>
@@ -4857,7 +4853,7 @@
           <a:p>
             <a:fld id="{969F32F5-AB1C-41B2-AE79-C9DE1D1745A4}" type="datetimeFigureOut">
               <a:rPr lang="en-US" smtClean="0"/>
-              <a:t>3/14/2017</a:t>
+              <a:t>3/15/2017</a:t>
             </a:fld>
             <a:endParaRPr lang="en-US"/>
           </a:p>
@@ -5286,7 +5282,7 @@
           <a:p>
             <a:r>
               <a:rPr lang="en-US" sz="3200" dirty="0"/>
-              <a:t>Week 1 Lecture Topics</a:t>
+              <a:t>Learning Objectives</a:t>
             </a:r>
             <a:endParaRPr lang="en-US" sz="3200" b="1" i="1" u="sng" dirty="0"/>
           </a:p>
@@ -5314,17 +5310,17 @@
           </a:bodyPr>
           <a:lstStyle/>
           <a:p>
-            <a:pPr marL="514350" indent="-514350">
+            <a:pPr marL="457200" indent="-457200">
               <a:buFont typeface="+mj-lt"/>
               <a:buAutoNum type="arabicPeriod"/>
             </a:pPr>
             <a:r>
               <a:rPr lang="en-US" sz="2200" dirty="0"/>
-              <a:t>Define object-oriented programming </a:t>
-            </a:r>
-          </a:p>
-          <a:p>
-            <a:pPr marL="514350" indent="-514350">
+              <a:t>Define object-oriented programming</a:t>
+            </a:r>
+          </a:p>
+          <a:p>
+            <a:pPr marL="457200" indent="-457200">
               <a:buFont typeface="+mj-lt"/>
               <a:buAutoNum type="arabicPeriod"/>
             </a:pPr>
@@ -5334,7 +5330,7 @@
             </a:r>
           </a:p>
           <a:p>
-            <a:pPr marL="514350" indent="-514350">
+            <a:pPr marL="457200" indent="-457200">
               <a:buFont typeface="+mj-lt"/>
               <a:buAutoNum type="arabicPeriod"/>
             </a:pPr>
@@ -5344,7 +5340,7 @@
             </a:r>
           </a:p>
           <a:p>
-            <a:pPr marL="514350" indent="-514350">
+            <a:pPr marL="457200" indent="-457200">
               <a:buFont typeface="+mj-lt"/>
               <a:buAutoNum type="arabicPeriod"/>
             </a:pPr>
@@ -5354,7 +5350,7 @@
             </a:r>
           </a:p>
           <a:p>
-            <a:pPr marL="514350" indent="-514350">
+            <a:pPr marL="457200" indent="-457200">
               <a:buFont typeface="+mj-lt"/>
               <a:buAutoNum type="arabicPeriod"/>
             </a:pPr>
@@ -5364,7 +5360,7 @@
             </a:r>
           </a:p>
           <a:p>
-            <a:pPr marL="514350" indent="-514350">
+            <a:pPr marL="457200" indent="-457200">
               <a:buFont typeface="+mj-lt"/>
               <a:buAutoNum type="arabicPeriod"/>
             </a:pPr>
@@ -5374,7 +5370,7 @@
             </a:r>
           </a:p>
           <a:p>
-            <a:pPr marL="514350" indent="-514350">
+            <a:pPr marL="457200" indent="-457200">
               <a:buFont typeface="+mj-lt"/>
               <a:buAutoNum type="arabicPeriod"/>
             </a:pPr>
@@ -5384,7 +5380,7 @@
             </a:r>
           </a:p>
           <a:p>
-            <a:pPr marL="514350" indent="-514350">
+            <a:pPr marL="457200" indent="-457200">
               <a:buFont typeface="+mj-lt"/>
               <a:buAutoNum type="arabicPeriod"/>
             </a:pPr>
@@ -5394,7 +5390,7 @@
             </a:r>
           </a:p>
           <a:p>
-            <a:pPr marL="514350" indent="-514350">
+            <a:pPr marL="457200" indent="-457200">
               <a:buFont typeface="+mj-lt"/>
               <a:buAutoNum type="arabicPeriod"/>
             </a:pPr>
@@ -5404,7 +5400,7 @@
             </a:r>
           </a:p>
           <a:p>
-            <a:pPr marL="514350" indent="-514350">
+            <a:pPr marL="457200" indent="-457200">
               <a:buFont typeface="+mj-lt"/>
               <a:buAutoNum type="arabicPeriod"/>
             </a:pPr>
@@ -5414,7 +5410,7 @@
             </a:r>
           </a:p>
           <a:p>
-            <a:pPr marL="514350" indent="-514350">
+            <a:pPr marL="457200" indent="-457200">
               <a:buFont typeface="+mj-lt"/>
               <a:buAutoNum type="arabicPeriod"/>
             </a:pPr>
@@ -5424,7 +5420,7 @@
             </a:r>
           </a:p>
           <a:p>
-            <a:pPr marL="514350" indent="-514350">
+            <a:pPr marL="457200" indent="-457200">
               <a:buFont typeface="+mj-lt"/>
               <a:buAutoNum type="arabicPeriod"/>
             </a:pPr>
@@ -5434,7 +5430,7 @@
             </a:r>
           </a:p>
           <a:p>
-            <a:pPr marL="514350" indent="-514350">
+            <a:pPr marL="457200" indent="-457200">
               <a:buFont typeface="+mj-lt"/>
               <a:buAutoNum type="arabicPeriod"/>
             </a:pPr>
@@ -5445,7 +5441,7 @@
             <a:endParaRPr lang="en-US" sz="2400" dirty="0"/>
           </a:p>
           <a:p>
-            <a:pPr marL="514350" indent="-514350">
+            <a:pPr marL="457200" indent="-457200">
               <a:buFont typeface="+mj-lt"/>
               <a:buAutoNum type="arabicPeriod"/>
             </a:pPr>
@@ -5455,7 +5451,7 @@
             </a:r>
           </a:p>
           <a:p>
-            <a:pPr marL="514350" indent="-514350">
+            <a:pPr marL="457200" indent="-457200">
               <a:buFont typeface="+mj-lt"/>
               <a:buAutoNum type="arabicPeriod"/>
             </a:pPr>
@@ -18505,7 +18501,6 @@
               <a:rPr lang="en-US" sz="2000" dirty="0"/>
               <a:t>TIOBE Index for March 2017:</a:t>
             </a:r>
-            <a:endParaRPr lang="en-US" sz="2000" dirty="0"/>
           </a:p>
         </p:txBody>
       </p:sp>
@@ -19197,7 +19192,6 @@
               <a:rPr lang="en-US" sz="2000" dirty="0"/>
               <a:t>	BMI = weight [kg] / (height [m] * height [m])</a:t>
             </a:r>
-            <a:endParaRPr lang="en-US" sz="2000" dirty="0"/>
           </a:p>
         </p:txBody>
       </p:sp>
@@ -22818,6 +22812,21 @@
 </file>
 
 <file path=customXml/item1.xml><?xml version="1.0" encoding="utf-8"?>
+<?mso-contentType ?>
+<FormTemplates xmlns="http://schemas.microsoft.com/sharepoint/v3/contenttype/forms">
+  <Display>DocumentLibraryForm</Display>
+  <Edit>DocumentLibraryForm</Edit>
+  <New>DocumentLibraryForm</New>
+</FormTemplates>
+</file>
+
+<file path=customXml/item2.xml><?xml version="1.0" encoding="utf-8"?>
+<p:properties xmlns:p="http://schemas.microsoft.com/office/2006/metadata/properties" xmlns:xsi="http://www.w3.org/2001/XMLSchema-instance" xmlns:pc="http://schemas.microsoft.com/office/infopath/2007/PartnerControls">
+  <documentManagement/>
+</p:properties>
+</file>
+
+<file path=customXml/item3.xml><?xml version="1.0" encoding="utf-8"?>
 <ct:contentTypeSchema xmlns:ct="http://schemas.microsoft.com/office/2006/metadata/contentType" xmlns:ma="http://schemas.microsoft.com/office/2006/metadata/properties/metaAttributes" ct:_="" ma:_="" ma:contentTypeName="Document" ma:contentTypeID="0x0101004E7FF26E314236448B954F3A97640002" ma:contentTypeVersion="0" ma:contentTypeDescription="Create a new document." ma:contentTypeScope="" ma:versionID="dcd134f7ef3b1aa8a267b1d1a9f0b332">
   <xsd:schema xmlns:xsd="http://www.w3.org/2001/XMLSchema" xmlns:xs="http://www.w3.org/2001/XMLSchema" xmlns:p="http://schemas.microsoft.com/office/2006/metadata/properties" targetNamespace="http://schemas.microsoft.com/office/2006/metadata/properties" ma:root="true" ma:fieldsID="fad425956ca267ea5e6d723b3f3bd6f1">
     <xsd:element name="properties">
@@ -22931,22 +22940,30 @@
 </ct:contentTypeSchema>
 </file>
 
-<file path=customXml/item2.xml><?xml version="1.0" encoding="utf-8"?>
-<p:properties xmlns:p="http://schemas.microsoft.com/office/2006/metadata/properties" xmlns:xsi="http://www.w3.org/2001/XMLSchema-instance" xmlns:pc="http://schemas.microsoft.com/office/infopath/2007/PartnerControls">
-  <documentManagement/>
-</p:properties>
+<file path=customXml/itemProps1.xml><?xml version="1.0" encoding="utf-8"?>
+<ds:datastoreItem xmlns:ds="http://schemas.openxmlformats.org/officeDocument/2006/customXml" ds:itemID="{87FD8B20-B89A-4B23-9329-175195DD4D8A}">
+  <ds:schemaRefs>
+    <ds:schemaRef ds:uri="http://schemas.microsoft.com/sharepoint/v3/contenttype/forms"/>
+  </ds:schemaRefs>
+</ds:datastoreItem>
 </file>
 
-<file path=customXml/item3.xml><?xml version="1.0" encoding="utf-8"?>
-<?mso-contentType ?>
-<FormTemplates xmlns="http://schemas.microsoft.com/sharepoint/v3/contenttype/forms">
-  <Display>DocumentLibraryForm</Display>
-  <Edit>DocumentLibraryForm</Edit>
-  <New>DocumentLibraryForm</New>
-</FormTemplates>
+<file path=customXml/itemProps2.xml><?xml version="1.0" encoding="utf-8"?>
+<ds:datastoreItem xmlns:ds="http://schemas.openxmlformats.org/officeDocument/2006/customXml" ds:itemID="{3473EA1A-2744-48E8-B2A3-4F89C0FC849C}">
+  <ds:schemaRefs>
+    <ds:schemaRef ds:uri="http://schemas.openxmlformats.org/package/2006/metadata/core-properties"/>
+    <ds:schemaRef ds:uri="http://purl.org/dc/dcmitype/"/>
+    <ds:schemaRef ds:uri="http://schemas.microsoft.com/office/infopath/2007/PartnerControls"/>
+    <ds:schemaRef ds:uri="http://purl.org/dc/elements/1.1/"/>
+    <ds:schemaRef ds:uri="http://schemas.microsoft.com/office/2006/documentManagement/types"/>
+    <ds:schemaRef ds:uri="http://purl.org/dc/terms/"/>
+    <ds:schemaRef ds:uri="http://schemas.microsoft.com/office/2006/metadata/properties"/>
+    <ds:schemaRef ds:uri="http://www.w3.org/XML/1998/namespace"/>
+  </ds:schemaRefs>
+</ds:datastoreItem>
 </file>
 
-<file path=customXml/itemProps1.xml><?xml version="1.0" encoding="utf-8"?>
+<file path=customXml/itemProps3.xml><?xml version="1.0" encoding="utf-8"?>
 <ds:datastoreItem xmlns:ds="http://schemas.openxmlformats.org/officeDocument/2006/customXml" ds:itemID="{A906A71E-D2C6-4CAA-8E79-10C504BC5F58}">
   <ds:schemaRefs>
     <ds:schemaRef ds:uri="http://schemas.microsoft.com/office/2006/metadata/contentType"/>
@@ -22960,27 +22977,4 @@
     <ds:schemaRef ds:uri="http://schemas.microsoft.com/office/infopath/2007/PartnerControls"/>
   </ds:schemaRefs>
 </ds:datastoreItem>
-</file>
-
-<file path=customXml/itemProps2.xml><?xml version="1.0" encoding="utf-8"?>
-<ds:datastoreItem xmlns:ds="http://schemas.openxmlformats.org/officeDocument/2006/customXml" ds:itemID="{3473EA1A-2744-48E8-B2A3-4F89C0FC849C}">
-  <ds:schemaRefs>
-    <ds:schemaRef ds:uri="http://schemas.microsoft.com/office/2006/documentManagement/types"/>
-    <ds:schemaRef ds:uri="http://schemas.microsoft.com/office/infopath/2007/PartnerControls"/>
-    <ds:schemaRef ds:uri="http://purl.org/dc/elements/1.1/"/>
-    <ds:schemaRef ds:uri="http://schemas.microsoft.com/office/2006/metadata/properties"/>
-    <ds:schemaRef ds:uri="http://purl.org/dc/terms/"/>
-    <ds:schemaRef ds:uri="http://schemas.openxmlformats.org/package/2006/metadata/core-properties"/>
-    <ds:schemaRef ds:uri="http://www.w3.org/XML/1998/namespace"/>
-    <ds:schemaRef ds:uri="http://purl.org/dc/dcmitype/"/>
-  </ds:schemaRefs>
-</ds:datastoreItem>
-</file>
-
-<file path=customXml/itemProps3.xml><?xml version="1.0" encoding="utf-8"?>
-<ds:datastoreItem xmlns:ds="http://schemas.openxmlformats.org/officeDocument/2006/customXml" ds:itemID="{87FD8B20-B89A-4B23-9329-175195DD4D8A}">
-  <ds:schemaRefs>
-    <ds:schemaRef ds:uri="http://schemas.microsoft.com/sharepoint/v3/contenttype/forms"/>
-  </ds:schemaRefs>
-</ds:datastoreItem>
 </file>
</xml_diff>

<commit_message>
Update class slides and notes.
</commit_message>
<xml_diff>
--- a/CPSC-24500/Week01/2016SpringW01Slides.pptx
+++ b/CPSC-24500/Week01/2016SpringW01Slides.pptx
@@ -834,30 +834,17 @@
           <a:p>
             <a:r>
               <a:rPr lang="en-US" dirty="0"/>
-              <a:t>Now as we are going through our object-oriented examples, be thinking about how you would answer the “What is Inheritance?” and “What is Polymorphism?” interview questions. Note that answering them both with very brief and </a:t>
-            </a:r>
+              <a:t>Now as we are going through our object-oriented examples, be thinking about how you would answer the “What is Inheritance?” and “What is Polymorphism?” interview questions. Note that answering them both with very brief and succinct animal examples can be very effective. </a:t>
+            </a:r>
+          </a:p>
+          <a:p>
+            <a:endParaRPr lang="en-US" dirty="0"/>
+          </a:p>
+          <a:p>
             <a:r>
               <a:rPr lang="en-US" dirty="0"/>
-              <a:t>succinct animal examples can be very effective. </a:t>
-            </a:r>
-          </a:p>
-          <a:p>
-            <a:endParaRPr lang="en-US" dirty="0"/>
-          </a:p>
-          <a:p>
-            <a:r>
-              <a:rPr lang="en-US" dirty="0"/>
-              <a:t>Now it would exceptional if we were also able to effectively utilize these concepts after we get the job </a:t>
-            </a:r>
-            <a:r>
-              <a:rPr lang="en-US" dirty="0"/>
-              <a:t>:-) Let’s start by walking through an example.</a:t>
-            </a:r>
-            <a:r>
-              <a:rPr lang="en-US" dirty="0"/>
-              <a:t> </a:t>
-            </a:r>
-            <a:endParaRPr lang="en-US" dirty="0"/>
+              <a:t>Now it would exceptional if we were also able to effectively utilize these concepts after we get the job :-) Let’s start by walking through an example. </a:t>
+            </a:r>
           </a:p>
         </p:txBody>
       </p:sp>
@@ -1400,7 +1387,7 @@
           <a:p>
             <a:r>
               <a:rPr lang="en-US" dirty="0"/>
-              <a:t>Consider: How would you add protective code around setting height to 0 in the first option? … in the second encapsulated example? Once again consider reuse, testing, and additional modification in thousands of lines off code. </a:t>
+              <a:t>Consider: How would you add protective code around setting height to 0 in the first option (height &gt; 2ft &amp; &lt;9ft)? … in the second encapsulated example? Once again consider reuse, testing, and additional modification in thousands of lines off code. </a:t>
             </a:r>
           </a:p>
           <a:p>
@@ -1418,7 +1405,7 @@
           <a:p>
             <a:r>
               <a:rPr lang="en-US" dirty="0"/>
-              <a:t>1 – Minimize variable scope: (1)none, (2)local, (3)method parameters, (4)private attribute, (5)protected attribute, and (6)public</a:t>
+              <a:t>#1 Rule for Encapsulation: Minimize class property and method scope and visibility: (1)none, (2)local, (3)method parameters, (4)private attribute, (5)protected attribute, and (6)public</a:t>
             </a:r>
           </a:p>
           <a:p>
@@ -1636,17 +1623,23 @@
           <a:p>
             <a:r>
               <a:rPr lang="en-US" dirty="0"/>
-              <a:t>Consider: How would you add protective code around setting height to 0 in the first option? … in the second encapsulated example? Once again consider reuse, testing, and additional modification in thousands of lines off code. </a:t>
+              <a:t>Abstract class</a:t>
+            </a:r>
+          </a:p>
+          <a:p>
+            <a:r>
+              <a:rPr lang="en-US" dirty="0"/>
+              <a:t>Abstract method</a:t>
+            </a:r>
+          </a:p>
+          <a:p>
+            <a:r>
+              <a:rPr lang="en-US" dirty="0"/>
+              <a:t>Descendant classes</a:t>
             </a:r>
           </a:p>
           <a:p>
             <a:endParaRPr lang="en-US" dirty="0"/>
-          </a:p>
-          <a:p>
-            <a:r>
-              <a:rPr lang="en-US" dirty="0"/>
-              <a:t>Encapsulation is a feature of nearly all modern development languages… not just object-oriented languages.</a:t>
-            </a:r>
           </a:p>
         </p:txBody>
       </p:sp>
@@ -3971,51 +3964,6 @@
           </a:p>
           <a:p>
             <a:pPr lvl="0"/>
-            <a:r>
-              <a:rPr lang="en-US" sz="1200" kern="1200" dirty="0">
-                <a:solidFill>
-                  <a:schemeClr val="tx1"/>
-                </a:solidFill>
-                <a:effectLst/>
-                <a:latin typeface="+mn-lt"/>
-                <a:ea typeface="+mn-ea"/>
-                <a:cs typeface="+mn-cs"/>
-              </a:rPr>
-              <a:t>Concepts – powerful features that prove indispensable to modern software development, brought to us automatically by object-oriented programming.</a:t>
-            </a:r>
-          </a:p>
-          <a:p>
-            <a:pPr lvl="0"/>
-            <a:r>
-              <a:rPr lang="en-US" sz="1200" kern="1200" dirty="0">
-                <a:solidFill>
-                  <a:schemeClr val="tx1"/>
-                </a:solidFill>
-                <a:effectLst/>
-                <a:latin typeface="+mn-lt"/>
-                <a:ea typeface="+mn-ea"/>
-                <a:cs typeface="+mn-cs"/>
-              </a:rPr>
-              <a:t>Patterns – tried-and-true templates for forging relationships between classes</a:t>
-            </a:r>
-          </a:p>
-          <a:p>
-            <a:pPr lvl="0"/>
-            <a:r>
-              <a:rPr lang="en-US" sz="1200" kern="1200" dirty="0">
-                <a:solidFill>
-                  <a:schemeClr val="tx1"/>
-                </a:solidFill>
-                <a:effectLst/>
-                <a:latin typeface="+mn-lt"/>
-                <a:ea typeface="+mn-ea"/>
-                <a:cs typeface="+mn-cs"/>
-              </a:rPr>
-              <a:t>Principles – guidelines that help you determine what classes are needed and how they should divide up the work </a:t>
-            </a:r>
-          </a:p>
-          <a:p>
-            <a:pPr lvl="0"/>
             <a:endParaRPr lang="en-US" sz="1200" kern="1200" dirty="0">
               <a:solidFill>
                 <a:schemeClr val="tx1"/>
@@ -7285,11 +7233,7 @@
           <a:p>
             <a:r>
               <a:rPr lang="en-US" dirty="0"/>
-              <a:t>Our procedural </a:t>
-            </a:r>
-            <a:r>
-              <a:rPr lang="en-US" dirty="0"/>
-              <a:t>(C) implementation of BMI would be a great example of Immobility. </a:t>
+              <a:t>Our procedural (C) implementation of BMI would be a great example of Immobility. </a:t>
             </a:r>
           </a:p>
         </p:txBody>
@@ -7376,11 +7320,7 @@
           <a:p>
             <a:r>
               <a:rPr lang="en-US" dirty="0"/>
-              <a:t>Our procedural </a:t>
-            </a:r>
-            <a:r>
-              <a:rPr lang="en-US" dirty="0"/>
-              <a:t>(C) implementation of BMI would be a great example of Immobility. </a:t>
+              <a:t>Our procedural (C) implementation of BMI would be a great example of Immobility. </a:t>
             </a:r>
           </a:p>
         </p:txBody>
@@ -11944,6 +11884,510 @@
     <p:extLst>
       <p:ext uri="{BB962C8B-B14F-4D97-AF65-F5344CB8AC3E}">
         <p14:creationId xmlns:p14="http://schemas.microsoft.com/office/powerpoint/2010/main" val="3214378928"/>
+      </p:ext>
+    </p:extLst>
+  </p:cSld>
+  <p:clrMapOvr>
+    <a:masterClrMapping/>
+  </p:clrMapOvr>
+</p:notes>
+</file>
+
+<file path=ppt/notesSlides/notesSlide41.xml><?xml version="1.0" encoding="utf-8"?>
+<p:notes xmlns:a="http://schemas.openxmlformats.org/drawingml/2006/main" xmlns:r="http://schemas.openxmlformats.org/officeDocument/2006/relationships" xmlns:p="http://schemas.openxmlformats.org/presentationml/2006/main">
+  <p:cSld>
+    <p:spTree>
+      <p:nvGrpSpPr>
+        <p:cNvPr id="1" name=""/>
+        <p:cNvGrpSpPr/>
+        <p:nvPr/>
+      </p:nvGrpSpPr>
+      <p:grpSpPr>
+        <a:xfrm>
+          <a:off x="0" y="0"/>
+          <a:ext cx="0" cy="0"/>
+          <a:chOff x="0" y="0"/>
+          <a:chExt cx="0" cy="0"/>
+        </a:xfrm>
+      </p:grpSpPr>
+      <p:sp>
+        <p:nvSpPr>
+          <p:cNvPr id="2" name="Slide Image Placeholder 1"/>
+          <p:cNvSpPr>
+            <a:spLocks noGrp="1" noRot="1" noChangeAspect="1"/>
+          </p:cNvSpPr>
+          <p:nvPr>
+            <p:ph type="sldImg"/>
+          </p:nvPr>
+        </p:nvSpPr>
+        <p:spPr/>
+      </p:sp>
+      <p:sp>
+        <p:nvSpPr>
+          <p:cNvPr id="3" name="Notes Placeholder 2"/>
+          <p:cNvSpPr>
+            <a:spLocks noGrp="1"/>
+          </p:cNvSpPr>
+          <p:nvPr>
+            <p:ph type="body" idx="1"/>
+          </p:nvPr>
+        </p:nvSpPr>
+        <p:spPr/>
+        <p:txBody>
+          <a:bodyPr/>
+          <a:lstStyle/>
+          <a:p>
+            <a:endParaRPr lang="en-US"/>
+          </a:p>
+        </p:txBody>
+      </p:sp>
+      <p:sp>
+        <p:nvSpPr>
+          <p:cNvPr id="4" name="Slide Number Placeholder 3"/>
+          <p:cNvSpPr>
+            <a:spLocks noGrp="1"/>
+          </p:cNvSpPr>
+          <p:nvPr>
+            <p:ph type="sldNum" sz="quarter" idx="10"/>
+          </p:nvPr>
+        </p:nvSpPr>
+        <p:spPr/>
+        <p:txBody>
+          <a:bodyPr/>
+          <a:lstStyle/>
+          <a:p>
+            <a:fld id="{5394DE12-7B9B-46AA-AC19-C30A49928B9B}" type="slidenum">
+              <a:rPr lang="en-US" smtClean="0"/>
+              <a:t>41</a:t>
+            </a:fld>
+            <a:endParaRPr lang="en-US"/>
+          </a:p>
+        </p:txBody>
+      </p:sp>
+    </p:spTree>
+    <p:extLst>
+      <p:ext uri="{BB962C8B-B14F-4D97-AF65-F5344CB8AC3E}">
+        <p14:creationId xmlns:p14="http://schemas.microsoft.com/office/powerpoint/2010/main" val="3292034553"/>
+      </p:ext>
+    </p:extLst>
+  </p:cSld>
+  <p:clrMapOvr>
+    <a:masterClrMapping/>
+  </p:clrMapOvr>
+</p:notes>
+</file>
+
+<file path=ppt/notesSlides/notesSlide42.xml><?xml version="1.0" encoding="utf-8"?>
+<p:notes xmlns:a="http://schemas.openxmlformats.org/drawingml/2006/main" xmlns:r="http://schemas.openxmlformats.org/officeDocument/2006/relationships" xmlns:p="http://schemas.openxmlformats.org/presentationml/2006/main">
+  <p:cSld>
+    <p:spTree>
+      <p:nvGrpSpPr>
+        <p:cNvPr id="1" name=""/>
+        <p:cNvGrpSpPr/>
+        <p:nvPr/>
+      </p:nvGrpSpPr>
+      <p:grpSpPr>
+        <a:xfrm>
+          <a:off x="0" y="0"/>
+          <a:ext cx="0" cy="0"/>
+          <a:chOff x="0" y="0"/>
+          <a:chExt cx="0" cy="0"/>
+        </a:xfrm>
+      </p:grpSpPr>
+      <p:sp>
+        <p:nvSpPr>
+          <p:cNvPr id="2" name="Slide Image Placeholder 1"/>
+          <p:cNvSpPr>
+            <a:spLocks noGrp="1" noRot="1" noChangeAspect="1"/>
+          </p:cNvSpPr>
+          <p:nvPr>
+            <p:ph type="sldImg"/>
+          </p:nvPr>
+        </p:nvSpPr>
+        <p:spPr/>
+      </p:sp>
+      <p:sp>
+        <p:nvSpPr>
+          <p:cNvPr id="3" name="Notes Placeholder 2"/>
+          <p:cNvSpPr>
+            <a:spLocks noGrp="1"/>
+          </p:cNvSpPr>
+          <p:nvPr>
+            <p:ph type="body" idx="1"/>
+          </p:nvPr>
+        </p:nvSpPr>
+        <p:spPr/>
+        <p:txBody>
+          <a:bodyPr/>
+          <a:lstStyle/>
+          <a:p>
+            <a:endParaRPr lang="en-US"/>
+          </a:p>
+        </p:txBody>
+      </p:sp>
+      <p:sp>
+        <p:nvSpPr>
+          <p:cNvPr id="4" name="Slide Number Placeholder 3"/>
+          <p:cNvSpPr>
+            <a:spLocks noGrp="1"/>
+          </p:cNvSpPr>
+          <p:nvPr>
+            <p:ph type="sldNum" sz="quarter" idx="10"/>
+          </p:nvPr>
+        </p:nvSpPr>
+        <p:spPr/>
+        <p:txBody>
+          <a:bodyPr/>
+          <a:lstStyle/>
+          <a:p>
+            <a:fld id="{5394DE12-7B9B-46AA-AC19-C30A49928B9B}" type="slidenum">
+              <a:rPr lang="en-US" smtClean="0"/>
+              <a:t>42</a:t>
+            </a:fld>
+            <a:endParaRPr lang="en-US"/>
+          </a:p>
+        </p:txBody>
+      </p:sp>
+    </p:spTree>
+    <p:extLst>
+      <p:ext uri="{BB962C8B-B14F-4D97-AF65-F5344CB8AC3E}">
+        <p14:creationId xmlns:p14="http://schemas.microsoft.com/office/powerpoint/2010/main" val="3218404389"/>
+      </p:ext>
+    </p:extLst>
+  </p:cSld>
+  <p:clrMapOvr>
+    <a:masterClrMapping/>
+  </p:clrMapOvr>
+</p:notes>
+</file>
+
+<file path=ppt/notesSlides/notesSlide43.xml><?xml version="1.0" encoding="utf-8"?>
+<p:notes xmlns:a="http://schemas.openxmlformats.org/drawingml/2006/main" xmlns:r="http://schemas.openxmlformats.org/officeDocument/2006/relationships" xmlns:p="http://schemas.openxmlformats.org/presentationml/2006/main">
+  <p:cSld>
+    <p:spTree>
+      <p:nvGrpSpPr>
+        <p:cNvPr id="1" name=""/>
+        <p:cNvGrpSpPr/>
+        <p:nvPr/>
+      </p:nvGrpSpPr>
+      <p:grpSpPr>
+        <a:xfrm>
+          <a:off x="0" y="0"/>
+          <a:ext cx="0" cy="0"/>
+          <a:chOff x="0" y="0"/>
+          <a:chExt cx="0" cy="0"/>
+        </a:xfrm>
+      </p:grpSpPr>
+      <p:sp>
+        <p:nvSpPr>
+          <p:cNvPr id="2" name="Slide Image Placeholder 1"/>
+          <p:cNvSpPr>
+            <a:spLocks noGrp="1" noRot="1" noChangeAspect="1"/>
+          </p:cNvSpPr>
+          <p:nvPr>
+            <p:ph type="sldImg"/>
+          </p:nvPr>
+        </p:nvSpPr>
+        <p:spPr/>
+      </p:sp>
+      <p:sp>
+        <p:nvSpPr>
+          <p:cNvPr id="3" name="Notes Placeholder 2"/>
+          <p:cNvSpPr>
+            <a:spLocks noGrp="1"/>
+          </p:cNvSpPr>
+          <p:nvPr>
+            <p:ph type="body" idx="1"/>
+          </p:nvPr>
+        </p:nvSpPr>
+        <p:spPr/>
+        <p:txBody>
+          <a:bodyPr/>
+          <a:lstStyle/>
+          <a:p>
+            <a:endParaRPr lang="en-US"/>
+          </a:p>
+        </p:txBody>
+      </p:sp>
+      <p:sp>
+        <p:nvSpPr>
+          <p:cNvPr id="4" name="Slide Number Placeholder 3"/>
+          <p:cNvSpPr>
+            <a:spLocks noGrp="1"/>
+          </p:cNvSpPr>
+          <p:nvPr>
+            <p:ph type="sldNum" sz="quarter" idx="10"/>
+          </p:nvPr>
+        </p:nvSpPr>
+        <p:spPr/>
+        <p:txBody>
+          <a:bodyPr/>
+          <a:lstStyle/>
+          <a:p>
+            <a:fld id="{5394DE12-7B9B-46AA-AC19-C30A49928B9B}" type="slidenum">
+              <a:rPr lang="en-US" smtClean="0"/>
+              <a:t>43</a:t>
+            </a:fld>
+            <a:endParaRPr lang="en-US"/>
+          </a:p>
+        </p:txBody>
+      </p:sp>
+    </p:spTree>
+    <p:extLst>
+      <p:ext uri="{BB962C8B-B14F-4D97-AF65-F5344CB8AC3E}">
+        <p14:creationId xmlns:p14="http://schemas.microsoft.com/office/powerpoint/2010/main" val="3226226606"/>
+      </p:ext>
+    </p:extLst>
+  </p:cSld>
+  <p:clrMapOvr>
+    <a:masterClrMapping/>
+  </p:clrMapOvr>
+</p:notes>
+</file>
+
+<file path=ppt/notesSlides/notesSlide44.xml><?xml version="1.0" encoding="utf-8"?>
+<p:notes xmlns:a="http://schemas.openxmlformats.org/drawingml/2006/main" xmlns:r="http://schemas.openxmlformats.org/officeDocument/2006/relationships" xmlns:p="http://schemas.openxmlformats.org/presentationml/2006/main">
+  <p:cSld>
+    <p:spTree>
+      <p:nvGrpSpPr>
+        <p:cNvPr id="1" name=""/>
+        <p:cNvGrpSpPr/>
+        <p:nvPr/>
+      </p:nvGrpSpPr>
+      <p:grpSpPr>
+        <a:xfrm>
+          <a:off x="0" y="0"/>
+          <a:ext cx="0" cy="0"/>
+          <a:chOff x="0" y="0"/>
+          <a:chExt cx="0" cy="0"/>
+        </a:xfrm>
+      </p:grpSpPr>
+      <p:sp>
+        <p:nvSpPr>
+          <p:cNvPr id="2" name="Slide Image Placeholder 1"/>
+          <p:cNvSpPr>
+            <a:spLocks noGrp="1" noRot="1" noChangeAspect="1"/>
+          </p:cNvSpPr>
+          <p:nvPr>
+            <p:ph type="sldImg"/>
+          </p:nvPr>
+        </p:nvSpPr>
+        <p:spPr/>
+      </p:sp>
+      <p:sp>
+        <p:nvSpPr>
+          <p:cNvPr id="3" name="Notes Placeholder 2"/>
+          <p:cNvSpPr>
+            <a:spLocks noGrp="1"/>
+          </p:cNvSpPr>
+          <p:nvPr>
+            <p:ph type="body" idx="1"/>
+          </p:nvPr>
+        </p:nvSpPr>
+        <p:spPr/>
+        <p:txBody>
+          <a:bodyPr/>
+          <a:lstStyle/>
+          <a:p>
+            <a:endParaRPr lang="en-US"/>
+          </a:p>
+        </p:txBody>
+      </p:sp>
+      <p:sp>
+        <p:nvSpPr>
+          <p:cNvPr id="4" name="Slide Number Placeholder 3"/>
+          <p:cNvSpPr>
+            <a:spLocks noGrp="1"/>
+          </p:cNvSpPr>
+          <p:nvPr>
+            <p:ph type="sldNum" sz="quarter" idx="10"/>
+          </p:nvPr>
+        </p:nvSpPr>
+        <p:spPr/>
+        <p:txBody>
+          <a:bodyPr/>
+          <a:lstStyle/>
+          <a:p>
+            <a:fld id="{5394DE12-7B9B-46AA-AC19-C30A49928B9B}" type="slidenum">
+              <a:rPr lang="en-US" smtClean="0"/>
+              <a:t>44</a:t>
+            </a:fld>
+            <a:endParaRPr lang="en-US"/>
+          </a:p>
+        </p:txBody>
+      </p:sp>
+    </p:spTree>
+    <p:extLst>
+      <p:ext uri="{BB962C8B-B14F-4D97-AF65-F5344CB8AC3E}">
+        <p14:creationId xmlns:p14="http://schemas.microsoft.com/office/powerpoint/2010/main" val="2150061687"/>
+      </p:ext>
+    </p:extLst>
+  </p:cSld>
+  <p:clrMapOvr>
+    <a:masterClrMapping/>
+  </p:clrMapOvr>
+</p:notes>
+</file>
+
+<file path=ppt/notesSlides/notesSlide45.xml><?xml version="1.0" encoding="utf-8"?>
+<p:notes xmlns:a="http://schemas.openxmlformats.org/drawingml/2006/main" xmlns:r="http://schemas.openxmlformats.org/officeDocument/2006/relationships" xmlns:p="http://schemas.openxmlformats.org/presentationml/2006/main">
+  <p:cSld>
+    <p:spTree>
+      <p:nvGrpSpPr>
+        <p:cNvPr id="1" name=""/>
+        <p:cNvGrpSpPr/>
+        <p:nvPr/>
+      </p:nvGrpSpPr>
+      <p:grpSpPr>
+        <a:xfrm>
+          <a:off x="0" y="0"/>
+          <a:ext cx="0" cy="0"/>
+          <a:chOff x="0" y="0"/>
+          <a:chExt cx="0" cy="0"/>
+        </a:xfrm>
+      </p:grpSpPr>
+      <p:sp>
+        <p:nvSpPr>
+          <p:cNvPr id="2" name="Slide Image Placeholder 1"/>
+          <p:cNvSpPr>
+            <a:spLocks noGrp="1" noRot="1" noChangeAspect="1"/>
+          </p:cNvSpPr>
+          <p:nvPr>
+            <p:ph type="sldImg"/>
+          </p:nvPr>
+        </p:nvSpPr>
+        <p:spPr/>
+      </p:sp>
+      <p:sp>
+        <p:nvSpPr>
+          <p:cNvPr id="3" name="Notes Placeholder 2"/>
+          <p:cNvSpPr>
+            <a:spLocks noGrp="1"/>
+          </p:cNvSpPr>
+          <p:nvPr>
+            <p:ph type="body" idx="1"/>
+          </p:nvPr>
+        </p:nvSpPr>
+        <p:spPr/>
+        <p:txBody>
+          <a:bodyPr/>
+          <a:lstStyle/>
+          <a:p>
+            <a:endParaRPr lang="en-US"/>
+          </a:p>
+        </p:txBody>
+      </p:sp>
+      <p:sp>
+        <p:nvSpPr>
+          <p:cNvPr id="4" name="Slide Number Placeholder 3"/>
+          <p:cNvSpPr>
+            <a:spLocks noGrp="1"/>
+          </p:cNvSpPr>
+          <p:nvPr>
+            <p:ph type="sldNum" sz="quarter" idx="10"/>
+          </p:nvPr>
+        </p:nvSpPr>
+        <p:spPr/>
+        <p:txBody>
+          <a:bodyPr/>
+          <a:lstStyle/>
+          <a:p>
+            <a:fld id="{5394DE12-7B9B-46AA-AC19-C30A49928B9B}" type="slidenum">
+              <a:rPr lang="en-US" smtClean="0"/>
+              <a:t>45</a:t>
+            </a:fld>
+            <a:endParaRPr lang="en-US"/>
+          </a:p>
+        </p:txBody>
+      </p:sp>
+    </p:spTree>
+    <p:extLst>
+      <p:ext uri="{BB962C8B-B14F-4D97-AF65-F5344CB8AC3E}">
+        <p14:creationId xmlns:p14="http://schemas.microsoft.com/office/powerpoint/2010/main" val="1155613932"/>
+      </p:ext>
+    </p:extLst>
+  </p:cSld>
+  <p:clrMapOvr>
+    <a:masterClrMapping/>
+  </p:clrMapOvr>
+</p:notes>
+</file>
+
+<file path=ppt/notesSlides/notesSlide46.xml><?xml version="1.0" encoding="utf-8"?>
+<p:notes xmlns:a="http://schemas.openxmlformats.org/drawingml/2006/main" xmlns:r="http://schemas.openxmlformats.org/officeDocument/2006/relationships" xmlns:p="http://schemas.openxmlformats.org/presentationml/2006/main">
+  <p:cSld>
+    <p:spTree>
+      <p:nvGrpSpPr>
+        <p:cNvPr id="1" name=""/>
+        <p:cNvGrpSpPr/>
+        <p:nvPr/>
+      </p:nvGrpSpPr>
+      <p:grpSpPr>
+        <a:xfrm>
+          <a:off x="0" y="0"/>
+          <a:ext cx="0" cy="0"/>
+          <a:chOff x="0" y="0"/>
+          <a:chExt cx="0" cy="0"/>
+        </a:xfrm>
+      </p:grpSpPr>
+      <p:sp>
+        <p:nvSpPr>
+          <p:cNvPr id="2" name="Slide Image Placeholder 1"/>
+          <p:cNvSpPr>
+            <a:spLocks noGrp="1" noRot="1" noChangeAspect="1"/>
+          </p:cNvSpPr>
+          <p:nvPr>
+            <p:ph type="sldImg"/>
+          </p:nvPr>
+        </p:nvSpPr>
+        <p:spPr/>
+      </p:sp>
+      <p:sp>
+        <p:nvSpPr>
+          <p:cNvPr id="3" name="Notes Placeholder 2"/>
+          <p:cNvSpPr>
+            <a:spLocks noGrp="1"/>
+          </p:cNvSpPr>
+          <p:nvPr>
+            <p:ph type="body" idx="1"/>
+          </p:nvPr>
+        </p:nvSpPr>
+        <p:spPr/>
+        <p:txBody>
+          <a:bodyPr/>
+          <a:lstStyle/>
+          <a:p>
+            <a:endParaRPr lang="en-US"/>
+          </a:p>
+        </p:txBody>
+      </p:sp>
+      <p:sp>
+        <p:nvSpPr>
+          <p:cNvPr id="4" name="Slide Number Placeholder 3"/>
+          <p:cNvSpPr>
+            <a:spLocks noGrp="1"/>
+          </p:cNvSpPr>
+          <p:nvPr>
+            <p:ph type="sldNum" sz="quarter" idx="10"/>
+          </p:nvPr>
+        </p:nvSpPr>
+        <p:spPr/>
+        <p:txBody>
+          <a:bodyPr/>
+          <a:lstStyle/>
+          <a:p>
+            <a:fld id="{5394DE12-7B9B-46AA-AC19-C30A49928B9B}" type="slidenum">
+              <a:rPr lang="en-US" smtClean="0"/>
+              <a:t>46</a:t>
+            </a:fld>
+            <a:endParaRPr lang="en-US"/>
+          </a:p>
+        </p:txBody>
+      </p:sp>
+    </p:spTree>
+    <p:extLst>
+      <p:ext uri="{BB962C8B-B14F-4D97-AF65-F5344CB8AC3E}">
+        <p14:creationId xmlns:p14="http://schemas.microsoft.com/office/powerpoint/2010/main" val="2693648868"/>
       </p:ext>
     </p:extLst>
   </p:cSld>
@@ -15319,10 +15763,10 @@
           <a:lstStyle/>
           <a:p>
             <a:r>
-              <a:rPr lang="en-US" sz="3200" dirty="0"/>
+              <a:rPr lang="en-US" sz="3600" dirty="0"/>
               <a:t>Learning Objectives</a:t>
             </a:r>
-            <a:endParaRPr lang="en-US" sz="3200" b="1" i="1" u="sng" dirty="0"/>
+            <a:endParaRPr lang="en-US" sz="3600" b="1" i="1" u="sng" dirty="0"/>
           </a:p>
         </p:txBody>
       </p:sp>
@@ -15480,7 +15924,15 @@
             </a:pPr>
             <a:r>
               <a:rPr lang="en-US" sz="2200" dirty="0"/>
-              <a:t>Define and discuss common object-oriented design principles and characteristics of bad software </a:t>
+              <a:t>Define and discuss common object-oriented design </a:t>
+            </a:r>
+            <a:r>
+              <a:rPr lang="en-US" sz="2200" u="sng" dirty="0"/>
+              <a:t>principles</a:t>
+            </a:r>
+            <a:r>
+              <a:rPr lang="en-US" sz="2200" dirty="0"/>
+              <a:t> and characteristics of bad software </a:t>
             </a:r>
           </a:p>
           <a:p>
@@ -15490,7 +15942,7 @@
             </a:pPr>
             <a:r>
               <a:rPr lang="en-US" sz="2200" dirty="0"/>
-              <a:t>Describe how object-oriented programming is fundamentally different</a:t>
+              <a:t>Recap: How is object-oriented programming is different</a:t>
             </a:r>
           </a:p>
           <a:p>
@@ -15500,7 +15952,7 @@
             </a:pPr>
             <a:r>
               <a:rPr lang="en-US" sz="2200" dirty="0"/>
-              <a:t>Justify the choice to use an object-oriented approach in developing software</a:t>
+              <a:t>Recap: Why did we choose to learn an object-oriented approach in developing software</a:t>
             </a:r>
           </a:p>
         </p:txBody>
@@ -15558,10 +16010,10 @@
           <a:lstStyle/>
           <a:p>
             <a:r>
-              <a:rPr lang="en-US" sz="3200" dirty="0"/>
+              <a:rPr lang="en-US" sz="3600" dirty="0"/>
               <a:t>Learning Objectives</a:t>
             </a:r>
-            <a:endParaRPr lang="en-US" sz="3200" b="1" i="1" u="sng" dirty="0"/>
+            <a:endParaRPr lang="en-US" sz="3600" b="1" i="1" u="sng" dirty="0"/>
           </a:p>
         </p:txBody>
       </p:sp>
@@ -15779,7 +16231,7 @@
             </a:pPr>
             <a:r>
               <a:rPr lang="en-US" sz="2200" dirty="0"/>
-              <a:t>Describe how object-oriented programming is fundamentally different</a:t>
+              <a:t>Recap: How is object-oriented programming is different</a:t>
             </a:r>
           </a:p>
           <a:p>
@@ -15789,7 +16241,7 @@
             </a:pPr>
             <a:r>
               <a:rPr lang="en-US" sz="2200" dirty="0"/>
-              <a:t>Justify the choice to use an object-oriented approach in developing software</a:t>
+              <a:t>Recap: Why did we choose to learn an object-oriented approach in developing software</a:t>
             </a:r>
           </a:p>
         </p:txBody>
@@ -15847,10 +16299,10 @@
           <a:lstStyle/>
           <a:p>
             <a:r>
-              <a:rPr lang="en-US" sz="3200" dirty="0"/>
+              <a:rPr lang="en-US" sz="3600" dirty="0"/>
               <a:t>Learning Objectives (Section 2)</a:t>
             </a:r>
-            <a:endParaRPr lang="en-US" sz="3200" b="1" i="1" u="sng" dirty="0"/>
+            <a:endParaRPr lang="en-US" sz="3600" b="1" i="1" u="sng" dirty="0"/>
           </a:p>
         </p:txBody>
       </p:sp>
@@ -16005,8 +16457,8 @@
           <a:lstStyle/>
           <a:p>
             <a:r>
-              <a:rPr lang="en-US" sz="3200" dirty="0"/>
-              <a:t>Identify and define “six” (three plus) object-oriented concepts</a:t>
+              <a:rPr lang="en-US" sz="3600" dirty="0"/>
+              <a:t>The “six” (Three plus) Object-Oriented Concepts</a:t>
             </a:r>
           </a:p>
         </p:txBody>
@@ -16203,17 +16655,17 @@
         <p:spPr>
           <a:xfrm>
             <a:off x="838200" y="365126"/>
-            <a:ext cx="2540679" cy="757272"/>
+            <a:ext cx="2739656" cy="757272"/>
           </a:xfrm>
         </p:spPr>
         <p:txBody>
           <a:bodyPr>
-            <a:normAutofit/>
+            <a:noAutofit/>
           </a:bodyPr>
           <a:lstStyle/>
           <a:p>
             <a:r>
-              <a:rPr lang="en-US" sz="3200" dirty="0"/>
+              <a:rPr lang="en-US" sz="3600" dirty="0"/>
               <a:t>The Problem? </a:t>
             </a:r>
           </a:p>
@@ -16229,7 +16681,7 @@
         </p:nvSpPr>
         <p:spPr>
           <a:xfrm>
-            <a:off x="3318164" y="365126"/>
+            <a:off x="3525493" y="368745"/>
             <a:ext cx="8446790" cy="757272"/>
           </a:xfrm>
           <a:prstGeom prst="rect">
@@ -16838,18 +17290,9 @@
           <a:lstStyle/>
           <a:p>
             <a:r>
-              <a:rPr lang="en-US" sz="3200" dirty="0"/>
-              <a:t>Revising Procedural </a:t>
-            </a:r>
-            <a:r>
-              <a:rPr lang="en-US" sz="3200" dirty="0"/>
-              <a:t>(C) </a:t>
-            </a:r>
-            <a:r>
-              <a:rPr lang="en-US" sz="3200" dirty="0"/>
-              <a:t>BMI Implementation</a:t>
-            </a:r>
-            <a:endParaRPr lang="en-US" sz="3200" dirty="0"/>
+              <a:rPr lang="en-US" sz="3600" dirty="0"/>
+              <a:t>Revising Procedural (C) BMI Implementation</a:t>
+            </a:r>
           </a:p>
         </p:txBody>
       </p:sp>
@@ -17248,15 +17691,7 @@
             </a:pPr>
             <a:r>
               <a:rPr lang="en-US" sz="1600" u="sng" dirty="0"/>
-              <a:t>Procedural BMI </a:t>
-            </a:r>
-            <a:r>
-              <a:rPr lang="en-US" sz="1600" u="sng" dirty="0"/>
-              <a:t>(C) - </a:t>
-            </a:r>
-            <a:r>
-              <a:rPr lang="en-US" sz="1600" u="sng" dirty="0"/>
-              <a:t>revised:</a:t>
+              <a:t>Procedural BMI (C) - revised:</a:t>
             </a:r>
           </a:p>
           <a:p>
@@ -17787,18 +18222,9 @@
           <a:lstStyle/>
           <a:p>
             <a:r>
-              <a:rPr lang="en-US" sz="3200" dirty="0"/>
-              <a:t>Revising Procedural </a:t>
-            </a:r>
-            <a:r>
-              <a:rPr lang="en-US" sz="3200" dirty="0"/>
-              <a:t>(C) </a:t>
-            </a:r>
-            <a:r>
-              <a:rPr lang="en-US" sz="3200" dirty="0"/>
-              <a:t>BMI Implementation</a:t>
-            </a:r>
-            <a:endParaRPr lang="en-US" sz="3200" dirty="0"/>
+              <a:rPr lang="en-US" sz="3600" dirty="0"/>
+              <a:t>Revising Procedural (C) BMI Implementation</a:t>
+            </a:r>
           </a:p>
         </p:txBody>
       </p:sp>
@@ -18197,15 +18623,7 @@
             </a:pPr>
             <a:r>
               <a:rPr lang="en-US" sz="1600" u="sng" dirty="0"/>
-              <a:t>Procedural BMI </a:t>
-            </a:r>
-            <a:r>
-              <a:rPr lang="en-US" sz="1600" u="sng" dirty="0"/>
-              <a:t>(C) - </a:t>
-            </a:r>
-            <a:r>
-              <a:rPr lang="en-US" sz="1600" u="sng" dirty="0"/>
-              <a:t>revised:</a:t>
+              <a:t>Procedural BMI (C) - revised:</a:t>
             </a:r>
           </a:p>
           <a:p>
@@ -18856,7 +19274,7 @@
           <a:lstStyle/>
           <a:p>
             <a:r>
-              <a:rPr lang="en-US" sz="3200" dirty="0"/>
+              <a:rPr lang="en-US" sz="3600" dirty="0"/>
               <a:t>Revising BMI Implementations</a:t>
             </a:r>
           </a:p>
@@ -19257,7 +19675,7 @@
             </a:pPr>
             <a:r>
               <a:rPr lang="en-US" sz="1600" u="sng" dirty="0"/>
-              <a:t>Object Oriented BMI (revised):</a:t>
+              <a:t>Object-Oriented BMI (revised):</a:t>
             </a:r>
           </a:p>
           <a:p>
@@ -19597,7 +20015,7 @@
           <a:lstStyle/>
           <a:p>
             <a:r>
-              <a:rPr lang="en-US" sz="3200" dirty="0"/>
+              <a:rPr lang="en-US" sz="3600" dirty="0"/>
               <a:t>Encapsulation</a:t>
             </a:r>
           </a:p>
@@ -20227,8 +20645,8 @@
           <a:lstStyle/>
           <a:p>
             <a:r>
-              <a:rPr lang="en-US" sz="3200" dirty="0"/>
-              <a:t>Inheritance Options to Implement English Units</a:t>
+              <a:rPr lang="en-US" sz="3600" dirty="0"/>
+              <a:t>Inheritance… Options to Implement English Units</a:t>
             </a:r>
           </a:p>
         </p:txBody>
@@ -20694,12 +21112,12 @@
         </p:spPr>
         <p:txBody>
           <a:bodyPr>
-            <a:normAutofit/>
+            <a:noAutofit/>
           </a:bodyPr>
           <a:lstStyle/>
           <a:p>
             <a:r>
-              <a:rPr lang="en-US" sz="3200" dirty="0"/>
+              <a:rPr lang="en-US" sz="3600" dirty="0"/>
               <a:t>Inheritance to implement English units… And Abstraction</a:t>
             </a:r>
           </a:p>
@@ -20988,10 +21406,10 @@
           <a:lstStyle/>
           <a:p>
             <a:r>
-              <a:rPr lang="en-US" sz="3200" dirty="0"/>
+              <a:rPr lang="en-US" sz="3600" dirty="0"/>
               <a:t>Learning Objectives (Section 1)</a:t>
             </a:r>
-            <a:endParaRPr lang="en-US" sz="3200" b="1" i="1" u="sng" dirty="0"/>
+            <a:endParaRPr lang="en-US" sz="3600" b="1" i="1" u="sng" dirty="0"/>
           </a:p>
         </p:txBody>
       </p:sp>
@@ -21145,13 +21563,13 @@
         </p:spPr>
         <p:txBody>
           <a:bodyPr>
-            <a:normAutofit fontScale="90000"/>
+            <a:normAutofit/>
           </a:bodyPr>
           <a:lstStyle/>
           <a:p>
             <a:r>
-              <a:rPr lang="en-US" sz="3200" dirty="0"/>
-              <a:t>Identify the superclass and the subclass in an inheritance relationship</a:t>
+              <a:rPr lang="en-US" sz="3600" dirty="0"/>
+              <a:t>Superclass and Subclass</a:t>
             </a:r>
           </a:p>
         </p:txBody>
@@ -21952,14 +22370,15 @@
         </p:spPr>
         <p:txBody>
           <a:bodyPr>
-            <a:normAutofit fontScale="90000"/>
+            <a:normAutofit/>
           </a:bodyPr>
           <a:lstStyle/>
           <a:p>
             <a:r>
-              <a:rPr lang="en-US" sz="3200" dirty="0"/>
-              <a:t>Identify the superclass and the subclass in an inheritance relationship</a:t>
-            </a:r>
+              <a:rPr lang="en-US" sz="3600" dirty="0"/>
+              <a:t>Superclass and Subclass</a:t>
+            </a:r>
+            <a:endParaRPr lang="en-US" sz="3600" dirty="0"/>
           </a:p>
         </p:txBody>
       </p:sp>
@@ -22893,13 +23312,13 @@
         </p:spPr>
         <p:txBody>
           <a:bodyPr>
-            <a:normAutofit fontScale="90000"/>
+            <a:normAutofit/>
           </a:bodyPr>
           <a:lstStyle/>
           <a:p>
             <a:r>
-              <a:rPr lang="en-US" sz="3200" dirty="0"/>
-              <a:t>Identify the superclass and the subclass in an inheritance relationship</a:t>
+              <a:rPr lang="en-US" sz="3600" dirty="0"/>
+              <a:t>Abstraction</a:t>
             </a:r>
           </a:p>
         </p:txBody>
@@ -23696,11 +24115,13 @@
           </a:xfrm>
         </p:spPr>
         <p:txBody>
-          <a:bodyPr/>
+          <a:bodyPr>
+            <a:normAutofit/>
+          </a:bodyPr>
           <a:lstStyle/>
           <a:p>
             <a:r>
-              <a:rPr lang="en-US" dirty="0"/>
+              <a:rPr lang="en-US" sz="3600" dirty="0"/>
               <a:t>Polymorphism</a:t>
             </a:r>
           </a:p>
@@ -24701,11 +25122,13 @@
         </p:nvSpPr>
         <p:spPr/>
         <p:txBody>
-          <a:bodyPr/>
+          <a:bodyPr>
+            <a:normAutofit/>
+          </a:bodyPr>
           <a:lstStyle/>
           <a:p>
             <a:r>
-              <a:rPr lang="en-US" dirty="0"/>
+              <a:rPr lang="en-US" sz="3600" dirty="0"/>
               <a:t>Composition &amp; Aggregation</a:t>
             </a:r>
           </a:p>
@@ -24723,7 +25146,7 @@
         </p:nvSpPr>
         <p:spPr>
           <a:xfrm>
-            <a:off x="838200" y="1825625"/>
+            <a:off x="838200" y="1719305"/>
             <a:ext cx="10515600" cy="1909248"/>
           </a:xfrm>
         </p:spPr>
@@ -24780,7 +25203,7 @@
         </p:nvGrpSpPr>
         <p:grpSpPr>
           <a:xfrm>
-            <a:off x="838200" y="3942054"/>
+            <a:off x="838200" y="3835734"/>
             <a:ext cx="10515600" cy="2052378"/>
             <a:chOff x="838200" y="3942054"/>
             <a:chExt cx="10515600" cy="2052378"/>
@@ -25186,20 +25609,22 @@
         </p:nvSpPr>
         <p:spPr/>
         <p:txBody>
-          <a:bodyPr/>
+          <a:bodyPr>
+            <a:normAutofit/>
+          </a:bodyPr>
           <a:lstStyle/>
           <a:p>
             <a:r>
-              <a:rPr lang="en-US" dirty="0"/>
+              <a:rPr lang="en-US" sz="3600" dirty="0"/>
               <a:t>Unified Modeling Language </a:t>
             </a:r>
             <a:r>
-              <a:rPr lang="en-US" dirty="0">
+              <a:rPr lang="en-US" sz="3600" dirty="0">
                 <a:hlinkClick r:id="rId3"/>
               </a:rPr>
               <a:t>[link]</a:t>
             </a:r>
-            <a:endParaRPr lang="en-US" dirty="0"/>
+            <a:endParaRPr lang="en-US" sz="3600" dirty="0"/>
           </a:p>
         </p:txBody>
       </p:sp>
@@ -25368,11 +25793,13 @@
         </p:nvSpPr>
         <p:spPr/>
         <p:txBody>
-          <a:bodyPr/>
+          <a:bodyPr>
+            <a:normAutofit/>
+          </a:bodyPr>
           <a:lstStyle/>
           <a:p>
             <a:r>
-              <a:rPr lang="en-US" dirty="0"/>
+              <a:rPr lang="en-US" sz="3600" dirty="0"/>
               <a:t>UML Example: Robot Arm</a:t>
             </a:r>
           </a:p>
@@ -25896,10 +26323,10 @@
           <a:lstStyle/>
           <a:p>
             <a:r>
-              <a:rPr lang="en-US" sz="3200" dirty="0"/>
+              <a:rPr lang="en-US" sz="3600" dirty="0"/>
               <a:t>Learning Objectives</a:t>
             </a:r>
-            <a:endParaRPr lang="en-US" sz="3200" b="1" i="1" u="sng" dirty="0"/>
+            <a:endParaRPr lang="en-US" sz="3600" b="1" i="1" u="sng" dirty="0"/>
           </a:p>
         </p:txBody>
       </p:sp>
@@ -26148,7 +26575,7 @@
             </a:pPr>
             <a:r>
               <a:rPr lang="en-US" sz="2200" dirty="0"/>
-              <a:t>Describe how object-oriented programming is fundamentally different</a:t>
+              <a:t>Recap: How is object-oriented programming is different</a:t>
             </a:r>
           </a:p>
           <a:p>
@@ -26158,7 +26585,7 @@
             </a:pPr>
             <a:r>
               <a:rPr lang="en-US" sz="2200" dirty="0"/>
-              <a:t>Justify the choice to use an object-oriented approach in developing software</a:t>
+              <a:t>Recap: Why did we choose to learn an object-oriented approach in developing software</a:t>
             </a:r>
           </a:p>
         </p:txBody>
@@ -26216,10 +26643,10 @@
           <a:lstStyle/>
           <a:p>
             <a:r>
-              <a:rPr lang="en-US" sz="3200" dirty="0"/>
+              <a:rPr lang="en-US" sz="3600" dirty="0"/>
               <a:t>Learning Objectives (Section 3)</a:t>
             </a:r>
-            <a:endParaRPr lang="en-US" sz="3200" b="1" i="1" u="sng" dirty="0"/>
+            <a:endParaRPr lang="en-US" sz="3600" b="1" i="1" u="sng" dirty="0"/>
           </a:p>
         </p:txBody>
       </p:sp>
@@ -26296,7 +26723,7 @@
             </a:pPr>
             <a:r>
               <a:rPr lang="en-US" sz="2000" dirty="0"/>
-              <a:t>Describe how object-oriented programming is fundamentally different</a:t>
+              <a:t>Recap: How is object-oriented programming is different</a:t>
             </a:r>
           </a:p>
           <a:p>
@@ -26309,7 +26736,7 @@
             </a:pPr>
             <a:r>
               <a:rPr lang="en-US" sz="2000" dirty="0"/>
-              <a:t>Justify the choice to use an object-oriented approach in developing software</a:t>
+              <a:t>Recap: Why did we choose to learn an object-oriented approach in developing software</a:t>
             </a:r>
           </a:p>
           <a:p>
@@ -26362,19 +26789,21 @@
         </p:nvSpPr>
         <p:spPr/>
         <p:txBody>
-          <a:bodyPr/>
+          <a:bodyPr>
+            <a:normAutofit/>
+          </a:bodyPr>
           <a:lstStyle/>
           <a:p>
             <a:r>
-              <a:rPr lang="en-US" dirty="0"/>
+              <a:rPr lang="en-US" sz="3600" dirty="0"/>
               <a:t>Object-Oriented Design </a:t>
             </a:r>
             <a:r>
-              <a:rPr lang="en-US" u="sng" dirty="0"/>
+              <a:rPr lang="en-US" sz="3600" u="sng" dirty="0"/>
               <a:t>Patterns</a:t>
             </a:r>
             <a:r>
-              <a:rPr lang="en-US" dirty="0"/>
+              <a:rPr lang="en-US" sz="3600" dirty="0"/>
               <a:t> </a:t>
             </a:r>
           </a:p>
@@ -26534,16 +26963,16 @@
           <a:lstStyle/>
           <a:p>
             <a:r>
-              <a:rPr lang="en-US" sz="3200" dirty="0"/>
-              <a:t>Define Object-Oriented Programming </a:t>
-            </a:r>
-            <a:r>
-              <a:rPr lang="en-US" sz="3200" dirty="0">
+              <a:rPr lang="en-US" sz="3600" dirty="0"/>
+              <a:t>Object-Oriented Programming </a:t>
+            </a:r>
+            <a:r>
+              <a:rPr lang="en-US" sz="3600" dirty="0">
                 <a:hlinkClick r:id="rId3"/>
               </a:rPr>
               <a:t>[link]</a:t>
             </a:r>
-            <a:endParaRPr lang="en-US" sz="3200" dirty="0"/>
+            <a:endParaRPr lang="en-US" sz="3600" dirty="0"/>
           </a:p>
         </p:txBody>
       </p:sp>
@@ -26560,12 +26989,12 @@
         <p:spPr>
           <a:xfrm>
             <a:off x="838200" y="1051756"/>
-            <a:ext cx="10622974" cy="1883743"/>
+            <a:ext cx="10622974" cy="4094402"/>
           </a:xfrm>
         </p:spPr>
         <p:txBody>
           <a:bodyPr>
-            <a:normAutofit lnSpcReduction="10000"/>
+            <a:normAutofit/>
           </a:bodyPr>
           <a:lstStyle/>
           <a:p>
@@ -26626,6 +27055,54 @@
               <a:rPr lang="en-US" sz="2000" dirty="0"/>
               <a:t>It includes concepts, patterns, and principles for designing and implementing modern software products.</a:t>
             </a:r>
+          </a:p>
+          <a:p>
+            <a:pPr>
+              <a:buFont typeface="Wingdings" panose="05000000000000000000" pitchFamily="2" charset="2"/>
+              <a:buChar char="§"/>
+            </a:pPr>
+            <a:r>
+              <a:rPr lang="en-US" sz="2000" u="sng" dirty="0"/>
+              <a:t>Concepts</a:t>
+            </a:r>
+            <a:r>
+              <a:rPr lang="en-US" sz="2000" dirty="0"/>
+              <a:t> – powerful features that prove indispensable to modern software development, brought to us automatically by object-oriented programming.</a:t>
+            </a:r>
+          </a:p>
+          <a:p>
+            <a:pPr>
+              <a:buFont typeface="Wingdings" panose="05000000000000000000" pitchFamily="2" charset="2"/>
+              <a:buChar char="§"/>
+            </a:pPr>
+            <a:r>
+              <a:rPr lang="en-US" sz="2000" u="sng" dirty="0"/>
+              <a:t>Patterns</a:t>
+            </a:r>
+            <a:r>
+              <a:rPr lang="en-US" sz="2000" dirty="0"/>
+              <a:t> – tried-and-true templates for forging relationships between classes</a:t>
+            </a:r>
+          </a:p>
+          <a:p>
+            <a:pPr>
+              <a:buFont typeface="Wingdings" panose="05000000000000000000" pitchFamily="2" charset="2"/>
+              <a:buChar char="§"/>
+            </a:pPr>
+            <a:r>
+              <a:rPr lang="en-US" sz="2000" u="sng" dirty="0"/>
+              <a:t>Principles</a:t>
+            </a:r>
+            <a:r>
+              <a:rPr lang="en-US" sz="2000" dirty="0"/>
+              <a:t> – guidelines that help you determine what classes are needed and how they should divide up the work </a:t>
+            </a:r>
+          </a:p>
+          <a:p>
+            <a:pPr marL="0" indent="0">
+              <a:buNone/>
+            </a:pPr>
+            <a:endParaRPr lang="en-US" sz="2000" dirty="0"/>
           </a:p>
         </p:txBody>
       </p:sp>
@@ -26680,7 +27157,6 @@
               <a:rPr lang="en-US" dirty="0"/>
               <a:t>Singleton Design Pattern</a:t>
             </a:r>
-            <a:endParaRPr lang="en-US" dirty="0"/>
           </a:p>
         </p:txBody>
       </p:sp>
@@ -26728,13 +27204,7 @@
               <a:rPr lang="en-US" dirty="0">
                 <a:hlinkClick r:id="rId3"/>
               </a:rPr>
-              <a:t>[</a:t>
-            </a:r>
-            <a:r>
-              <a:rPr lang="en-US" dirty="0">
-                <a:hlinkClick r:id="rId3"/>
-              </a:rPr>
-              <a:t>link]</a:t>
+              <a:t>[link]</a:t>
             </a:r>
             <a:endParaRPr lang="en-US" dirty="0"/>
           </a:p>
@@ -26812,10 +27282,9 @@
           <a:lstStyle/>
           <a:p>
             <a:r>
-              <a:rPr lang="en-US" dirty="0"/>
+              <a:rPr lang="en-US" sz="3600" dirty="0"/>
               <a:t>Factory Design Pattern</a:t>
             </a:r>
-            <a:endParaRPr lang="en-US" dirty="0"/>
           </a:p>
         </p:txBody>
       </p:sp>
@@ -26885,7 +27354,6 @@
               <a:rPr lang="en-US" sz="2000" dirty="0"/>
               <a:t>Another example would be  a Shape Factory that return shapes based on input, but does not expose how the shapes are created. See coding example. </a:t>
             </a:r>
-            <a:endParaRPr lang="en-US" sz="2000" dirty="0"/>
           </a:p>
         </p:txBody>
       </p:sp>
@@ -26969,7 +27437,6 @@
               <a:rPr lang="en-US" dirty="0"/>
               <a:t>Delegation Design Pattern</a:t>
             </a:r>
-            <a:endParaRPr lang="en-US" dirty="0"/>
           </a:p>
         </p:txBody>
       </p:sp>
@@ -27140,10 +27607,9 @@
           <a:lstStyle/>
           <a:p>
             <a:r>
-              <a:rPr lang="en-US" dirty="0"/>
+              <a:rPr lang="en-US" sz="3600" dirty="0"/>
               <a:t>Model-View-Controller</a:t>
             </a:r>
-            <a:endParaRPr lang="en-US" dirty="0"/>
           </a:p>
         </p:txBody>
       </p:sp>
@@ -27512,19 +27978,21 @@
         </p:nvSpPr>
         <p:spPr/>
         <p:txBody>
-          <a:bodyPr/>
+          <a:bodyPr>
+            <a:normAutofit/>
+          </a:bodyPr>
           <a:lstStyle/>
           <a:p>
             <a:r>
-              <a:rPr lang="en-US" dirty="0"/>
+              <a:rPr lang="en-US" sz="3600" dirty="0"/>
               <a:t>Object-Oriented Design </a:t>
             </a:r>
             <a:r>
-              <a:rPr lang="en-US" u="sng" dirty="0"/>
+              <a:rPr lang="en-US" sz="3600" u="sng" dirty="0"/>
               <a:t>Principles</a:t>
             </a:r>
             <a:r>
-              <a:rPr lang="en-US" dirty="0"/>
+              <a:rPr lang="en-US" sz="3600" dirty="0"/>
               <a:t> </a:t>
             </a:r>
           </a:p>
@@ -27675,10 +28143,9 @@
           <a:lstStyle/>
           <a:p>
             <a:r>
-              <a:rPr lang="en-US" dirty="0"/>
+              <a:rPr lang="en-US" sz="3600" dirty="0"/>
               <a:t>Open Close Principle</a:t>
             </a:r>
-            <a:endParaRPr lang="en-US" dirty="0"/>
           </a:p>
         </p:txBody>
       </p:sp>
@@ -28013,17 +28480,9 @@
           <a:lstStyle/>
           <a:p>
             <a:r>
-              <a:rPr lang="en-US" dirty="0"/>
-              <a:t>Dependency Inversion </a:t>
-            </a:r>
-            <a:br>
-              <a:rPr lang="en-US" dirty="0"/>
-            </a:br>
-            <a:r>
-              <a:rPr lang="en-US" dirty="0"/>
-              <a:t>Principle</a:t>
-            </a:r>
-            <a:endParaRPr lang="en-US" dirty="0"/>
+              <a:rPr lang="en-US" sz="3600" dirty="0"/>
+              <a:t>Dependency Inversion Principle</a:t>
+            </a:r>
           </a:p>
         </p:txBody>
       </p:sp>
@@ -28334,10 +28793,9 @@
           <a:lstStyle/>
           <a:p>
             <a:r>
-              <a:rPr lang="en-US" dirty="0"/>
+              <a:rPr lang="en-US" sz="3600" dirty="0"/>
               <a:t>Interface Segregation Principle</a:t>
             </a:r>
-            <a:endParaRPr lang="en-US" dirty="0"/>
           </a:p>
         </p:txBody>
       </p:sp>
@@ -28665,10 +29123,9 @@
           <a:lstStyle/>
           <a:p>
             <a:r>
-              <a:rPr lang="en-US" dirty="0"/>
+              <a:rPr lang="en-US" sz="3600" dirty="0"/>
               <a:t>Single Responsibility Principle</a:t>
             </a:r>
-            <a:endParaRPr lang="en-US" dirty="0"/>
           </a:p>
         </p:txBody>
       </p:sp>
@@ -28777,8 +29234,8 @@
           <a:lstStyle/>
           <a:p>
             <a:r>
-              <a:rPr lang="en-US" sz="3200" dirty="0"/>
-              <a:t>Position Object-Oriented Programming within Various Development Methodologies</a:t>
+              <a:rPr lang="en-US" sz="3600" dirty="0"/>
+              <a:t>Object-Oriented Programming within Various Development Methodologies</a:t>
             </a:r>
           </a:p>
         </p:txBody>
@@ -29758,14 +30215,13 @@
           <a:lstStyle/>
           <a:p>
             <a:r>
-              <a:rPr lang="en-US" dirty="0" err="1"/>
+              <a:rPr lang="en-US" sz="3600" dirty="0" err="1"/>
               <a:t>Liskov</a:t>
             </a:r>
             <a:r>
-              <a:rPr lang="en-US" dirty="0"/>
+              <a:rPr lang="en-US" sz="3600" dirty="0"/>
               <a:t> Substitution Principle</a:t>
             </a:r>
-            <a:endParaRPr lang="en-US" dirty="0"/>
           </a:p>
         </p:txBody>
       </p:sp>
@@ -30042,18 +30498,14 @@
         <p:spPr/>
         <p:txBody>
           <a:bodyPr>
-            <a:normAutofit fontScale="90000"/>
+            <a:normAutofit/>
           </a:bodyPr>
           <a:lstStyle/>
           <a:p>
             <a:r>
-              <a:rPr lang="en-US" dirty="0"/>
-              <a:t>Describe how object-oriented programming is fundamentally different</a:t>
-            </a:r>
-            <a:br>
-              <a:rPr lang="en-US" dirty="0"/>
-            </a:br>
-            <a:endParaRPr lang="en-US" dirty="0"/>
+              <a:rPr lang="en-US" sz="3600" dirty="0"/>
+              <a:t>Recap: Object-Oriented Programming</a:t>
+            </a:r>
           </a:p>
         </p:txBody>
       </p:sp>
@@ -30069,10 +30521,119 @@
         </p:nvSpPr>
         <p:spPr/>
         <p:txBody>
-          <a:bodyPr/>
+          <a:bodyPr>
+            <a:normAutofit/>
+          </a:bodyPr>
           <a:lstStyle/>
           <a:p>
-            <a:endParaRPr lang="en-US" dirty="0"/>
+            <a:pPr>
+              <a:buFont typeface="Wingdings" panose="05000000000000000000" pitchFamily="2" charset="2"/>
+              <a:buChar char="§"/>
+            </a:pPr>
+            <a:r>
+              <a:rPr lang="en-US" sz="2000" dirty="0"/>
+              <a:t>Rich is practice and theory with well accepted </a:t>
+            </a:r>
+            <a:r>
+              <a:rPr lang="en-US" sz="2000" u="sng" dirty="0"/>
+              <a:t>concepts</a:t>
+            </a:r>
+            <a:r>
+              <a:rPr lang="en-US" sz="2000" dirty="0"/>
+              <a:t>, </a:t>
+            </a:r>
+            <a:r>
+              <a:rPr lang="en-US" sz="2000" u="sng" dirty="0"/>
+              <a:t>patterns</a:t>
+            </a:r>
+            <a:r>
+              <a:rPr lang="en-US" sz="2000" dirty="0"/>
+              <a:t>, and </a:t>
+            </a:r>
+            <a:r>
+              <a:rPr lang="en-US" sz="2000" u="sng" dirty="0"/>
+              <a:t>principles</a:t>
+            </a:r>
+          </a:p>
+          <a:p>
+            <a:pPr>
+              <a:buFont typeface="Wingdings" panose="05000000000000000000" pitchFamily="2" charset="2"/>
+              <a:buChar char="§"/>
+            </a:pPr>
+            <a:r>
+              <a:rPr lang="en-US" sz="2000" dirty="0"/>
+              <a:t>Consistent support for powerful concepts including features that support:</a:t>
+            </a:r>
+          </a:p>
+          <a:p>
+            <a:pPr lvl="1">
+              <a:buFont typeface="Wingdings" panose="05000000000000000000" pitchFamily="2" charset="2"/>
+              <a:buChar char="q"/>
+            </a:pPr>
+            <a:r>
+              <a:rPr lang="en-US" sz="1600" dirty="0"/>
+              <a:t>Encapsulation… and Information Hiding </a:t>
+            </a:r>
+          </a:p>
+          <a:p>
+            <a:pPr lvl="1">
+              <a:buFont typeface="Wingdings" panose="05000000000000000000" pitchFamily="2" charset="2"/>
+              <a:buChar char="q"/>
+            </a:pPr>
+            <a:r>
+              <a:rPr lang="en-US" sz="1600" dirty="0"/>
+              <a:t>Inheritance… and Abstraction</a:t>
+            </a:r>
+          </a:p>
+          <a:p>
+            <a:pPr lvl="1">
+              <a:buFont typeface="Wingdings" panose="05000000000000000000" pitchFamily="2" charset="2"/>
+              <a:buChar char="q"/>
+            </a:pPr>
+            <a:r>
+              <a:rPr lang="en-US" sz="1600" dirty="0"/>
+              <a:t>Polymorphism</a:t>
+            </a:r>
+          </a:p>
+          <a:p>
+            <a:pPr>
+              <a:buFont typeface="Wingdings" panose="05000000000000000000" pitchFamily="2" charset="2"/>
+              <a:buChar char="§"/>
+            </a:pPr>
+            <a:r>
+              <a:rPr lang="en-US" sz="2000" dirty="0"/>
+              <a:t>Strong support for delivering extensible, maintainable, supportable, and scalable solutions</a:t>
+            </a:r>
+          </a:p>
+          <a:p>
+            <a:pPr>
+              <a:buFont typeface="Wingdings" panose="05000000000000000000" pitchFamily="2" charset="2"/>
+              <a:buChar char="§"/>
+            </a:pPr>
+            <a:r>
+              <a:rPr lang="en-US" sz="2000" dirty="0"/>
+              <a:t>Long history of industry success in managing complexity and delivering solutions that minimize rigidity, fragility, and immobility.</a:t>
+            </a:r>
+          </a:p>
+          <a:p>
+            <a:pPr>
+              <a:buFont typeface="Wingdings" panose="05000000000000000000" pitchFamily="2" charset="2"/>
+              <a:buChar char="§"/>
+            </a:pPr>
+            <a:r>
+              <a:rPr lang="en-US" sz="2000" dirty="0"/>
+              <a:t>Encompasses both design and programming activities</a:t>
+            </a:r>
+          </a:p>
+          <a:p>
+            <a:pPr>
+              <a:buFont typeface="Wingdings" panose="05000000000000000000" pitchFamily="2" charset="2"/>
+              <a:buChar char="§"/>
+            </a:pPr>
+            <a:r>
+              <a:rPr lang="en-US" sz="2000" dirty="0"/>
+              <a:t>Provides benefit across various development methodologies</a:t>
+            </a:r>
           </a:p>
         </p:txBody>
       </p:sp>
@@ -30119,18 +30680,15 @@
         <p:spPr/>
         <p:txBody>
           <a:bodyPr>
-            <a:normAutofit fontScale="90000"/>
+            <a:normAutofit/>
           </a:bodyPr>
           <a:lstStyle/>
           <a:p>
             <a:r>
-              <a:rPr lang="en-US" dirty="0"/>
-              <a:t>Justify the choice to use an object-oriented approach in developing software</a:t>
-            </a:r>
-            <a:br>
-              <a:rPr lang="en-US" dirty="0"/>
-            </a:br>
-            <a:endParaRPr lang="en-US" dirty="0"/>
+              <a:rPr lang="en-US" sz="3600" dirty="0"/>
+              <a:t>Recap: Why Choose an Object-Oriented Approach</a:t>
+            </a:r>
+            <a:endParaRPr lang="en-US" sz="3600" dirty="0"/>
           </a:p>
         </p:txBody>
       </p:sp>
@@ -30149,6 +30707,60 @@
           <a:bodyPr/>
           <a:lstStyle/>
           <a:p>
+            <a:pPr marL="0" indent="0">
+              <a:buNone/>
+            </a:pPr>
+            <a:r>
+              <a:rPr lang="en-US" dirty="0"/>
+              <a:t>#1 – This is the best way we know to consistently deliver high quality software products.</a:t>
+            </a:r>
+          </a:p>
+          <a:p>
+            <a:pPr marL="0" indent="0">
+              <a:buNone/>
+            </a:pPr>
+            <a:endParaRPr lang="en-US" dirty="0"/>
+          </a:p>
+          <a:p>
+            <a:pPr marL="0" indent="0">
+              <a:buNone/>
+            </a:pPr>
+            <a:r>
+              <a:rPr lang="en-US" dirty="0"/>
+              <a:t>#2 – It is the approach demanded by the industry where we hope to be employed.</a:t>
+            </a:r>
+          </a:p>
+          <a:p>
+            <a:pPr marL="0" indent="0">
+              <a:buNone/>
+            </a:pPr>
+            <a:endParaRPr lang="en-US" dirty="0"/>
+          </a:p>
+          <a:p>
+            <a:pPr marL="0" indent="0">
+              <a:buNone/>
+            </a:pPr>
+            <a:r>
+              <a:rPr lang="en-US" dirty="0"/>
+              <a:t>#3 – It’s an enjoyable way to build software solutions.</a:t>
+            </a:r>
+          </a:p>
+          <a:p>
+            <a:pPr marL="0" indent="0">
+              <a:buNone/>
+            </a:pPr>
+            <a:endParaRPr lang="en-US" dirty="0"/>
+          </a:p>
+          <a:p>
+            <a:pPr marL="0" indent="0">
+              <a:buNone/>
+            </a:pPr>
+            <a:endParaRPr lang="en-US" dirty="0"/>
+          </a:p>
+          <a:p>
+            <a:pPr marL="0" indent="0">
+              <a:buNone/>
+            </a:pPr>
             <a:endParaRPr lang="en-US" dirty="0"/>
           </a:p>
         </p:txBody>
@@ -30222,7 +30834,7 @@
           <a:p>
             <a:r>
               <a:rPr lang="en-US" dirty="0">
-                <a:hlinkClick r:id="rId2"/>
+                <a:hlinkClick r:id="rId3"/>
               </a:rPr>
               <a:t>Waterfall</a:t>
             </a:r>
@@ -30232,7 +30844,7 @@
             </a:r>
             <a:r>
               <a:rPr lang="en-US" dirty="0">
-                <a:hlinkClick r:id="rId3"/>
+                <a:hlinkClick r:id="rId4"/>
               </a:rPr>
               <a:t>Iterative</a:t>
             </a:r>
@@ -30242,7 +30854,7 @@
             </a:r>
             <a:r>
               <a:rPr lang="en-US" dirty="0">
-                <a:hlinkClick r:id="rId4"/>
+                <a:hlinkClick r:id="rId5"/>
               </a:rPr>
               <a:t>Agile</a:t>
             </a:r>
@@ -30304,7 +30916,7 @@
           <a:p>
             <a:r>
               <a:rPr lang="en-US" sz="3200" dirty="0">
-                <a:hlinkClick r:id="rId2"/>
+                <a:hlinkClick r:id="rId3"/>
               </a:rPr>
               <a:t>Waterfall</a:t>
             </a:r>
@@ -30314,7 +30926,7 @@
             </a:r>
             <a:r>
               <a:rPr lang="en-US" sz="3200" dirty="0">
-                <a:hlinkClick r:id="rId3"/>
+                <a:hlinkClick r:id="rId4"/>
               </a:rPr>
               <a:t>Iterative</a:t>
             </a:r>
@@ -30324,7 +30936,7 @@
             </a:r>
             <a:r>
               <a:rPr lang="en-US" sz="3200" dirty="0">
-                <a:hlinkClick r:id="rId4"/>
+                <a:hlinkClick r:id="rId5"/>
               </a:rPr>
               <a:t>Agile</a:t>
             </a:r>
@@ -30489,7 +31101,7 @@
                           <a:latin typeface="+mn-lt"/>
                           <a:ea typeface="+mn-ea"/>
                           <a:cs typeface="+mn-cs"/>
-                          <a:hlinkClick r:id="rId5"/>
+                          <a:hlinkClick r:id="rId6"/>
                         </a:rPr>
                         <a:t>DOD-STD-2167A</a:t>
                       </a:r>
@@ -30526,7 +31138,7 @@
                           <a:latin typeface="+mn-lt"/>
                           <a:ea typeface="+mn-ea"/>
                           <a:cs typeface="+mn-cs"/>
-                          <a:hlinkClick r:id="rId6" tooltip="Rational Unified Process"/>
+                          <a:hlinkClick r:id="rId7" tooltip="Rational Unified Process"/>
                         </a:rPr>
                         <a:t>Rational Unified Process</a:t>
                       </a:r>
@@ -30553,7 +31165,7 @@
                           <a:latin typeface="+mn-lt"/>
                           <a:ea typeface="+mn-ea"/>
                           <a:cs typeface="+mn-cs"/>
-                          <a:hlinkClick r:id="rId7" tooltip="Open Unified Process"/>
+                          <a:hlinkClick r:id="rId8" tooltip="Open Unified Process"/>
                         </a:rPr>
                         <a:t>Open Unified Process</a:t>
                       </a:r>
@@ -30590,7 +31202,7 @@
                           <a:latin typeface="+mn-lt"/>
                           <a:ea typeface="+mn-ea"/>
                           <a:cs typeface="+mn-cs"/>
-                          <a:hlinkClick r:id="rId8" tooltip="Scrum (development)"/>
+                          <a:hlinkClick r:id="rId9" tooltip="Scrum (development)"/>
                         </a:rPr>
                         <a:t>Scrum</a:t>
                       </a:r>
@@ -30614,7 +31226,7 @@
                           <a:latin typeface="+mn-lt"/>
                           <a:ea typeface="+mn-ea"/>
                           <a:cs typeface="+mn-cs"/>
-                          <a:hlinkClick r:id="rId9"/>
+                          <a:hlinkClick r:id="rId10"/>
                         </a:rPr>
                         <a:t>Kanban</a:t>
                       </a:r>
@@ -30638,7 +31250,7 @@
                           <a:latin typeface="+mn-lt"/>
                           <a:ea typeface="+mn-ea"/>
                           <a:cs typeface="+mn-cs"/>
-                          <a:hlinkClick r:id="rId10"/>
+                          <a:hlinkClick r:id="rId11"/>
                         </a:rPr>
                         <a:t>Scaled Agile Framework (SAFe)</a:t>
                       </a:r>
@@ -31286,7 +31898,7 @@
           <a:p>
             <a:r>
               <a:rPr lang="en-US" sz="3200" dirty="0">
-                <a:hlinkClick r:id="rId2"/>
+                <a:hlinkClick r:id="rId3"/>
               </a:rPr>
               <a:t>Waterfall</a:t>
             </a:r>
@@ -31296,7 +31908,7 @@
             </a:r>
             <a:r>
               <a:rPr lang="en-US" sz="3200" dirty="0">
-                <a:hlinkClick r:id="rId3"/>
+                <a:hlinkClick r:id="rId4"/>
               </a:rPr>
               <a:t>Iterative</a:t>
             </a:r>
@@ -31306,7 +31918,7 @@
             </a:r>
             <a:r>
               <a:rPr lang="en-US" sz="3200" dirty="0">
-                <a:hlinkClick r:id="rId4"/>
+                <a:hlinkClick r:id="rId5"/>
               </a:rPr>
               <a:t>Agile</a:t>
             </a:r>
@@ -31524,7 +32136,7 @@
                           <a:latin typeface="+mn-lt"/>
                           <a:ea typeface="Calibri" panose="020F0502020204030204" pitchFamily="34" charset="0"/>
                           <a:cs typeface="Times New Roman" panose="02020603050405020304" pitchFamily="18" charset="0"/>
-                          <a:hlinkClick r:id="rId5"/>
+                          <a:hlinkClick r:id="rId6"/>
                         </a:rPr>
                         <a:t>XP</a:t>
                       </a:r>
@@ -31566,7 +32178,7 @@
                           <a:latin typeface="+mn-lt"/>
                           <a:ea typeface="Calibri" panose="020F0502020204030204" pitchFamily="34" charset="0"/>
                           <a:cs typeface="Times New Roman" panose="02020603050405020304" pitchFamily="18" charset="0"/>
-                          <a:hlinkClick r:id="rId5"/>
+                          <a:hlinkClick r:id="rId6"/>
                         </a:rPr>
                         <a:t>XP</a:t>
                       </a:r>
@@ -31601,7 +32213,7 @@
                           <a:latin typeface="+mn-lt"/>
                           <a:ea typeface="Calibri" panose="020F0502020204030204" pitchFamily="34" charset="0"/>
                           <a:cs typeface="Times New Roman" panose="02020603050405020304" pitchFamily="18" charset="0"/>
-                          <a:hlinkClick r:id="rId6"/>
+                          <a:hlinkClick r:id="rId7"/>
                         </a:rPr>
                         <a:t>DevOps</a:t>
                       </a:r>
@@ -32538,7 +33150,7 @@
           <a:p>
             <a:r>
               <a:rPr lang="en-US" sz="3200" dirty="0">
-                <a:hlinkClick r:id="rId2"/>
+                <a:hlinkClick r:id="rId3"/>
               </a:rPr>
               <a:t>Waterfall</a:t>
             </a:r>
@@ -32548,7 +33160,7 @@
             </a:r>
             <a:r>
               <a:rPr lang="en-US" sz="3200" dirty="0">
-                <a:hlinkClick r:id="rId3"/>
+                <a:hlinkClick r:id="rId4"/>
               </a:rPr>
               <a:t>Iterative</a:t>
             </a:r>
@@ -32558,7 +33170,7 @@
             </a:r>
             <a:r>
               <a:rPr lang="en-US" sz="3200" dirty="0">
-                <a:hlinkClick r:id="rId4"/>
+                <a:hlinkClick r:id="rId5"/>
               </a:rPr>
               <a:t>Agile</a:t>
             </a:r>
@@ -33743,8 +34355,8 @@
           <a:lstStyle/>
           <a:p>
             <a:r>
-              <a:rPr lang="en-US" sz="3200" dirty="0"/>
-              <a:t>Review object-oriented languages and tools</a:t>
+              <a:rPr lang="en-US" sz="3600" dirty="0"/>
+              <a:t>Object-Oriented Languages and Tools</a:t>
             </a:r>
           </a:p>
         </p:txBody>
@@ -33761,7 +34373,7 @@
         </p:nvSpPr>
         <p:spPr>
           <a:xfrm>
-            <a:off x="838200" y="1051757"/>
+            <a:off x="838200" y="1083653"/>
             <a:ext cx="10622974" cy="1299558"/>
           </a:xfrm>
         </p:spPr>
@@ -34427,8 +35039,8 @@
           <a:lstStyle/>
           <a:p>
             <a:r>
-              <a:rPr lang="en-US" sz="3200" dirty="0"/>
-              <a:t>Demonstrate concepts with example</a:t>
+              <a:rPr lang="en-US" sz="3600" dirty="0"/>
+              <a:t>Object-Oriented Concepts Example</a:t>
             </a:r>
           </a:p>
         </p:txBody>
@@ -34462,7 +35074,6 @@
               <a:rPr lang="en-US" sz="2000" dirty="0"/>
               <a:t>Implementing the body mass index (BMI) calculation in Java and C should allow us to effectively demonstrate some object-oriented design and programming concepts (Java). We will also compare that to how we would have implemented the same calculation using procedural programming techniques.</a:t>
             </a:r>
-            <a:endParaRPr lang="en-US" sz="2000" dirty="0"/>
           </a:p>
           <a:p>
             <a:pPr marL="0" indent="0">
@@ -35308,7 +35919,7 @@
           <a:lstStyle/>
           <a:p>
             <a:r>
-              <a:rPr lang="en-US" sz="3200" dirty="0"/>
+              <a:rPr lang="en-US" sz="3600" dirty="0"/>
               <a:t>Example: Procedural vs. Object Oriented Programming</a:t>
             </a:r>
           </a:p>
@@ -35799,8 +36410,8 @@
           <a:lstStyle/>
           <a:p>
             <a:r>
-              <a:rPr lang="en-US" sz="3200" dirty="0"/>
-              <a:t>Distinguish between a class and an object</a:t>
+              <a:rPr lang="en-US" sz="3600" dirty="0"/>
+              <a:t>Distinguish Between a Class and an Object</a:t>
             </a:r>
           </a:p>
         </p:txBody>
@@ -35860,7 +36471,7 @@
         </p:nvSpPr>
         <p:spPr>
           <a:xfrm>
-            <a:off x="4697431" y="202482"/>
+            <a:off x="4729327" y="202482"/>
             <a:ext cx="565426" cy="309217"/>
           </a:xfrm>
           <a:prstGeom prst="downArrow">
@@ -36622,8 +37233,9 @@
           <a:p>
             <a:r>
               <a:rPr lang="en-US" sz="3200" dirty="0"/>
-              <a:t>Distinguish between a class and an object</a:t>
-            </a:r>
+              <a:t>Distinguish Between a Class and an Object</a:t>
+            </a:r>
+            <a:endParaRPr lang="en-US" sz="3200" dirty="0"/>
           </a:p>
         </p:txBody>
       </p:sp>
@@ -36682,7 +37294,7 @@
         </p:nvSpPr>
         <p:spPr>
           <a:xfrm>
-            <a:off x="6907645" y="202482"/>
+            <a:off x="6960805" y="202482"/>
             <a:ext cx="565426" cy="309217"/>
           </a:xfrm>
           <a:prstGeom prst="downArrow">
@@ -37902,6 +38514,12 @@
 </file>
 
 <file path=customXml/item1.xml><?xml version="1.0" encoding="utf-8"?>
+<p:properties xmlns:p="http://schemas.microsoft.com/office/2006/metadata/properties" xmlns:xsi="http://www.w3.org/2001/XMLSchema-instance" xmlns:pc="http://schemas.microsoft.com/office/infopath/2007/PartnerControls">
+  <documentManagement/>
+</p:properties>
+</file>
+
+<file path=customXml/item2.xml><?xml version="1.0" encoding="utf-8"?>
 <ct:contentTypeSchema xmlns:ct="http://schemas.microsoft.com/office/2006/metadata/contentType" xmlns:ma="http://schemas.microsoft.com/office/2006/metadata/properties/metaAttributes" ct:_="" ma:_="" ma:contentTypeName="Document" ma:contentTypeID="0x0101004E7FF26E314236448B954F3A97640002" ma:contentTypeVersion="0" ma:contentTypeDescription="Create a new document." ma:contentTypeScope="" ma:versionID="dcd134f7ef3b1aa8a267b1d1a9f0b332">
   <xsd:schema xmlns:xsd="http://www.w3.org/2001/XMLSchema" xmlns:xs="http://www.w3.org/2001/XMLSchema" xmlns:p="http://schemas.microsoft.com/office/2006/metadata/properties" targetNamespace="http://schemas.microsoft.com/office/2006/metadata/properties" ma:root="true" ma:fieldsID="fad425956ca267ea5e6d723b3f3bd6f1">
     <xsd:element name="properties">
@@ -38015,12 +38633,6 @@
 </ct:contentTypeSchema>
 </file>
 
-<file path=customXml/item2.xml><?xml version="1.0" encoding="utf-8"?>
-<p:properties xmlns:p="http://schemas.microsoft.com/office/2006/metadata/properties" xmlns:xsi="http://www.w3.org/2001/XMLSchema-instance" xmlns:pc="http://schemas.microsoft.com/office/infopath/2007/PartnerControls">
-  <documentManagement/>
-</p:properties>
-</file>
-
 <file path=customXml/item3.xml><?xml version="1.0" encoding="utf-8"?>
 <?mso-contentType ?>
 <FormTemplates xmlns="http://schemas.microsoft.com/sharepoint/v3/contenttype/forms">
@@ -38031,6 +38643,21 @@
 </file>
 
 <file path=customXml/itemProps1.xml><?xml version="1.0" encoding="utf-8"?>
+<ds:datastoreItem xmlns:ds="http://schemas.openxmlformats.org/officeDocument/2006/customXml" ds:itemID="{3473EA1A-2744-48E8-B2A3-4F89C0FC849C}">
+  <ds:schemaRefs>
+    <ds:schemaRef ds:uri="http://purl.org/dc/terms/"/>
+    <ds:schemaRef ds:uri="http://schemas.openxmlformats.org/package/2006/metadata/core-properties"/>
+    <ds:schemaRef ds:uri="http://schemas.microsoft.com/office/2006/documentManagement/types"/>
+    <ds:schemaRef ds:uri="http://schemas.microsoft.com/office/infopath/2007/PartnerControls"/>
+    <ds:schemaRef ds:uri="http://purl.org/dc/elements/1.1/"/>
+    <ds:schemaRef ds:uri="http://schemas.microsoft.com/office/2006/metadata/properties"/>
+    <ds:schemaRef ds:uri="http://www.w3.org/XML/1998/namespace"/>
+    <ds:schemaRef ds:uri="http://purl.org/dc/dcmitype/"/>
+  </ds:schemaRefs>
+</ds:datastoreItem>
+</file>
+
+<file path=customXml/itemProps2.xml><?xml version="1.0" encoding="utf-8"?>
 <ds:datastoreItem xmlns:ds="http://schemas.openxmlformats.org/officeDocument/2006/customXml" ds:itemID="{A906A71E-D2C6-4CAA-8E79-10C504BC5F58}">
   <ds:schemaRefs>
     <ds:schemaRef ds:uri="http://schemas.microsoft.com/office/2006/metadata/contentType"/>
@@ -38046,21 +38673,6 @@
 </ds:datastoreItem>
 </file>
 
-<file path=customXml/itemProps2.xml><?xml version="1.0" encoding="utf-8"?>
-<ds:datastoreItem xmlns:ds="http://schemas.openxmlformats.org/officeDocument/2006/customXml" ds:itemID="{3473EA1A-2744-48E8-B2A3-4F89C0FC849C}">
-  <ds:schemaRefs>
-    <ds:schemaRef ds:uri="http://schemas.microsoft.com/office/infopath/2007/PartnerControls"/>
-    <ds:schemaRef ds:uri="http://purl.org/dc/elements/1.1/"/>
-    <ds:schemaRef ds:uri="http://schemas.microsoft.com/office/2006/metadata/properties"/>
-    <ds:schemaRef ds:uri="http://schemas.microsoft.com/office/2006/documentManagement/types"/>
-    <ds:schemaRef ds:uri="http://purl.org/dc/terms/"/>
-    <ds:schemaRef ds:uri="http://schemas.openxmlformats.org/package/2006/metadata/core-properties"/>
-    <ds:schemaRef ds:uri="http://purl.org/dc/dcmitype/"/>
-    <ds:schemaRef ds:uri="http://www.w3.org/XML/1998/namespace"/>
-  </ds:schemaRefs>
-</ds:datastoreItem>
-</file>
-
 <file path=customXml/itemProps3.xml><?xml version="1.0" encoding="utf-8"?>
 <ds:datastoreItem xmlns:ds="http://schemas.openxmlformats.org/officeDocument/2006/customXml" ds:itemID="{87FD8B20-B89A-4B23-9329-175195DD4D8A}">
   <ds:schemaRefs>

</xml_diff>